<commit_message>
add things in report and pptx
</commit_message>
<xml_diff>
--- a/presentation.pptx
+++ b/presentation.pptx
@@ -13,18 +13,19 @@
     <p:sldId id="275" r:id="rId7"/>
     <p:sldId id="260" r:id="rId8"/>
     <p:sldId id="262" r:id="rId9"/>
-    <p:sldId id="263" r:id="rId10"/>
-    <p:sldId id="264" r:id="rId11"/>
-    <p:sldId id="265" r:id="rId12"/>
-    <p:sldId id="266" r:id="rId13"/>
-    <p:sldId id="267" r:id="rId14"/>
-    <p:sldId id="268" r:id="rId15"/>
-    <p:sldId id="269" r:id="rId16"/>
-    <p:sldId id="270" r:id="rId17"/>
-    <p:sldId id="271" r:id="rId18"/>
-    <p:sldId id="272" r:id="rId19"/>
-    <p:sldId id="273" r:id="rId20"/>
-    <p:sldId id="274" r:id="rId21"/>
+    <p:sldId id="276" r:id="rId10"/>
+    <p:sldId id="263" r:id="rId11"/>
+    <p:sldId id="264" r:id="rId12"/>
+    <p:sldId id="265" r:id="rId13"/>
+    <p:sldId id="266" r:id="rId14"/>
+    <p:sldId id="267" r:id="rId15"/>
+    <p:sldId id="268" r:id="rId16"/>
+    <p:sldId id="269" r:id="rId17"/>
+    <p:sldId id="270" r:id="rId18"/>
+    <p:sldId id="271" r:id="rId19"/>
+    <p:sldId id="272" r:id="rId20"/>
+    <p:sldId id="273" r:id="rId21"/>
+    <p:sldId id="274" r:id="rId22"/>
   </p:sldIdLst>
   <p:sldSz cx="12192000" cy="6858000"/>
   <p:notesSz cx="6858000" cy="9144000"/>
@@ -278,7 +279,7 @@
           <a:p>
             <a:fld id="{D8DEE257-71C3-4FDF-91F5-D1DF2799CB84}" type="datetimeFigureOut">
               <a:rPr lang="el-GR" smtClean="0"/>
-              <a:t>6/8/2024</a:t>
+              <a:t>20/9/2024</a:t>
             </a:fld>
             <a:endParaRPr lang="el-GR"/>
           </a:p>
@@ -476,7 +477,7 @@
           <a:p>
             <a:fld id="{D8DEE257-71C3-4FDF-91F5-D1DF2799CB84}" type="datetimeFigureOut">
               <a:rPr lang="el-GR" smtClean="0"/>
-              <a:t>6/8/2024</a:t>
+              <a:t>20/9/2024</a:t>
             </a:fld>
             <a:endParaRPr lang="el-GR"/>
           </a:p>
@@ -684,7 +685,7 @@
           <a:p>
             <a:fld id="{D8DEE257-71C3-4FDF-91F5-D1DF2799CB84}" type="datetimeFigureOut">
               <a:rPr lang="el-GR" smtClean="0"/>
-              <a:t>6/8/2024</a:t>
+              <a:t>20/9/2024</a:t>
             </a:fld>
             <a:endParaRPr lang="el-GR"/>
           </a:p>
@@ -882,7 +883,7 @@
           <a:p>
             <a:fld id="{D8DEE257-71C3-4FDF-91F5-D1DF2799CB84}" type="datetimeFigureOut">
               <a:rPr lang="el-GR" smtClean="0"/>
-              <a:t>6/8/2024</a:t>
+              <a:t>20/9/2024</a:t>
             </a:fld>
             <a:endParaRPr lang="el-GR"/>
           </a:p>
@@ -1157,7 +1158,7 @@
           <a:p>
             <a:fld id="{D8DEE257-71C3-4FDF-91F5-D1DF2799CB84}" type="datetimeFigureOut">
               <a:rPr lang="el-GR" smtClean="0"/>
-              <a:t>6/8/2024</a:t>
+              <a:t>20/9/2024</a:t>
             </a:fld>
             <a:endParaRPr lang="el-GR"/>
           </a:p>
@@ -1422,7 +1423,7 @@
           <a:p>
             <a:fld id="{D8DEE257-71C3-4FDF-91F5-D1DF2799CB84}" type="datetimeFigureOut">
               <a:rPr lang="el-GR" smtClean="0"/>
-              <a:t>6/8/2024</a:t>
+              <a:t>20/9/2024</a:t>
             </a:fld>
             <a:endParaRPr lang="el-GR"/>
           </a:p>
@@ -1834,7 +1835,7 @@
           <a:p>
             <a:fld id="{D8DEE257-71C3-4FDF-91F5-D1DF2799CB84}" type="datetimeFigureOut">
               <a:rPr lang="el-GR" smtClean="0"/>
-              <a:t>6/8/2024</a:t>
+              <a:t>20/9/2024</a:t>
             </a:fld>
             <a:endParaRPr lang="el-GR"/>
           </a:p>
@@ -1975,7 +1976,7 @@
           <a:p>
             <a:fld id="{D8DEE257-71C3-4FDF-91F5-D1DF2799CB84}" type="datetimeFigureOut">
               <a:rPr lang="el-GR" smtClean="0"/>
-              <a:t>6/8/2024</a:t>
+              <a:t>20/9/2024</a:t>
             </a:fld>
             <a:endParaRPr lang="el-GR"/>
           </a:p>
@@ -2088,7 +2089,7 @@
           <a:p>
             <a:fld id="{D8DEE257-71C3-4FDF-91F5-D1DF2799CB84}" type="datetimeFigureOut">
               <a:rPr lang="el-GR" smtClean="0"/>
-              <a:t>6/8/2024</a:t>
+              <a:t>20/9/2024</a:t>
             </a:fld>
             <a:endParaRPr lang="el-GR"/>
           </a:p>
@@ -2399,7 +2400,7 @@
           <a:p>
             <a:fld id="{D8DEE257-71C3-4FDF-91F5-D1DF2799CB84}" type="datetimeFigureOut">
               <a:rPr lang="el-GR" smtClean="0"/>
-              <a:t>6/8/2024</a:t>
+              <a:t>20/9/2024</a:t>
             </a:fld>
             <a:endParaRPr lang="el-GR"/>
           </a:p>
@@ -2687,7 +2688,7 @@
           <a:p>
             <a:fld id="{D8DEE257-71C3-4FDF-91F5-D1DF2799CB84}" type="datetimeFigureOut">
               <a:rPr lang="el-GR" smtClean="0"/>
-              <a:t>6/8/2024</a:t>
+              <a:t>20/9/2024</a:t>
             </a:fld>
             <a:endParaRPr lang="el-GR"/>
           </a:p>
@@ -2934,7 +2935,7 @@
           <a:p>
             <a:fld id="{D8DEE257-71C3-4FDF-91F5-D1DF2799CB84}" type="datetimeFigureOut">
               <a:rPr lang="el-GR" smtClean="0"/>
-              <a:t>6/8/2024</a:t>
+              <a:t>20/9/2024</a:t>
             </a:fld>
             <a:endParaRPr lang="el-GR"/>
           </a:p>
@@ -3451,6 +3452,727 @@
 </file>
 
 <file path=ppt/slides/slide10.xml><?xml version="1.0" encoding="utf-8"?>
+<p:sld xmlns:a="http://schemas.openxmlformats.org/drawingml/2006/main" xmlns:r="http://schemas.openxmlformats.org/officeDocument/2006/relationships" xmlns:p="http://schemas.openxmlformats.org/presentationml/2006/main">
+  <p:cSld>
+    <p:spTree>
+      <p:nvGrpSpPr>
+        <p:cNvPr id="1" name=""/>
+        <p:cNvGrpSpPr/>
+        <p:nvPr/>
+      </p:nvGrpSpPr>
+      <p:grpSpPr>
+        <a:xfrm>
+          <a:off x="0" y="0"/>
+          <a:ext cx="0" cy="0"/>
+          <a:chOff x="0" y="0"/>
+          <a:chExt cx="0" cy="0"/>
+        </a:xfrm>
+      </p:grpSpPr>
+      <p:sp>
+        <p:nvSpPr>
+          <p:cNvPr id="2" name="Τίτλος 1">
+            <a:extLst>
+              <a:ext uri="{FF2B5EF4-FFF2-40B4-BE49-F238E27FC236}">
+                <a16:creationId xmlns:a16="http://schemas.microsoft.com/office/drawing/2014/main" id="{A50AA08C-B015-2B1B-C8AE-0401A678D833}"/>
+              </a:ext>
+            </a:extLst>
+          </p:cNvPr>
+          <p:cNvSpPr>
+            <a:spLocks noGrp="1"/>
+          </p:cNvSpPr>
+          <p:nvPr>
+            <p:ph type="title"/>
+          </p:nvPr>
+        </p:nvSpPr>
+        <p:spPr/>
+        <p:txBody>
+          <a:bodyPr/>
+          <a:lstStyle/>
+          <a:p>
+            <a:pPr algn="ctr"/>
+            <a:r>
+              <a:rPr lang="el-GR" dirty="0">
+                <a:solidFill>
+                  <a:schemeClr val="bg1"/>
+                </a:solidFill>
+              </a:rPr>
+              <a:t>ΠΕΡΙΟΡΙΣΜΟΙ</a:t>
+            </a:r>
+          </a:p>
+        </p:txBody>
+      </p:sp>
+      <mc:AlternateContent xmlns:mc="http://schemas.openxmlformats.org/markup-compatibility/2006" xmlns:a14="http://schemas.microsoft.com/office/drawing/2010/main">
+        <mc:Choice Requires="a14">
+          <p:sp>
+            <p:nvSpPr>
+              <p:cNvPr id="3" name="Θέση περιεχομένου 2">
+                <a:extLst>
+                  <a:ext uri="{FF2B5EF4-FFF2-40B4-BE49-F238E27FC236}">
+                    <a16:creationId xmlns:a16="http://schemas.microsoft.com/office/drawing/2014/main" id="{3E06C2F6-D0AB-64DE-E24F-BD4DA26DB27C}"/>
+                  </a:ext>
+                </a:extLst>
+              </p:cNvPr>
+              <p:cNvSpPr>
+                <a:spLocks noGrp="1"/>
+              </p:cNvSpPr>
+              <p:nvPr>
+                <p:ph idx="1"/>
+              </p:nvPr>
+            </p:nvSpPr>
+            <p:spPr/>
+            <p:txBody>
+              <a:bodyPr/>
+              <a:lstStyle/>
+              <a:p>
+                <a:pPr marL="0" lvl="0" indent="0">
+                  <a:lnSpc>
+                    <a:spcPct val="107000"/>
+                  </a:lnSpc>
+                  <a:buNone/>
+                  <a:tabLst>
+                    <a:tab pos="5274310" algn="r"/>
+                  </a:tabLst>
+                </a:pPr>
+                <a:r>
+                  <a:rPr lang="el-GR" dirty="0">
+                    <a:solidFill>
+                      <a:schemeClr val="bg1"/>
+                    </a:solidFill>
+                  </a:rPr>
+                  <a:t>1) </a:t>
+                </a:r>
+                <a:r>
+                  <a:rPr lang="el-GR" sz="2000" kern="100" dirty="0">
+                    <a:solidFill>
+                      <a:schemeClr val="bg1"/>
+                    </a:solidFill>
+                    <a:effectLst/>
+                    <a:latin typeface="Aptos" panose="020B0004020202020204" pitchFamily="34" charset="0"/>
+                    <a:ea typeface="Times New Roman" panose="02020603050405020304" pitchFamily="18" charset="0"/>
+                    <a:cs typeface="Times New Roman" panose="02020603050405020304" pitchFamily="18" charset="0"/>
+                  </a:rPr>
+                  <a:t>Μια ομάδα παίζει μόνο ένα παιχνίδι κάθε αγωνιστική</a:t>
+                </a:r>
+                <a:endParaRPr lang="el-GR" sz="2000" kern="100" dirty="0">
+                  <a:solidFill>
+                    <a:schemeClr val="bg1"/>
+                  </a:solidFill>
+                  <a:effectLst/>
+                  <a:latin typeface="Aptos" panose="020B0004020202020204" pitchFamily="34" charset="0"/>
+                  <a:ea typeface="Aptos" panose="020B0004020202020204" pitchFamily="34" charset="0"/>
+                  <a:cs typeface="Times New Roman" panose="02020603050405020304" pitchFamily="18" charset="0"/>
+                </a:endParaRPr>
+              </a:p>
+              <a:p>
+                <a:pPr indent="0" algn="ctr">
+                  <a:lnSpc>
+                    <a:spcPct val="107000"/>
+                  </a:lnSpc>
+                  <a:buNone/>
+                  <a:tabLst>
+                    <a:tab pos="5274310" algn="r"/>
+                  </a:tabLst>
+                </a:pPr>
+                <a:r>
+                  <a:rPr lang="el-GR" sz="1800" kern="100" dirty="0">
+                    <a:solidFill>
+                      <a:schemeClr val="bg1"/>
+                    </a:solidFill>
+                    <a:effectLst/>
+                    <a:latin typeface="Aptos" panose="020B0004020202020204" pitchFamily="34" charset="0"/>
+                    <a:ea typeface="Times New Roman" panose="02020603050405020304" pitchFamily="18" charset="0"/>
+                    <a:cs typeface="Times New Roman" panose="02020603050405020304" pitchFamily="18" charset="0"/>
+                  </a:rPr>
+                  <a:t> </a:t>
+                </a:r>
+                <a:endParaRPr lang="el-GR" sz="1800" kern="100" dirty="0">
+                  <a:solidFill>
+                    <a:schemeClr val="bg1"/>
+                  </a:solidFill>
+                  <a:effectLst/>
+                  <a:latin typeface="Aptos" panose="020B0004020202020204" pitchFamily="34" charset="0"/>
+                  <a:ea typeface="Aptos" panose="020B0004020202020204" pitchFamily="34" charset="0"/>
+                  <a:cs typeface="Times New Roman" panose="02020603050405020304" pitchFamily="18" charset="0"/>
+                </a:endParaRPr>
+              </a:p>
+              <a:p>
+                <a:pPr indent="0" algn="ctr">
+                  <a:lnSpc>
+                    <a:spcPct val="107000"/>
+                  </a:lnSpc>
+                  <a:buNone/>
+                  <a:tabLst>
+                    <a:tab pos="5274310" algn="r"/>
+                  </a:tabLst>
+                </a:pPr>
+                <a14:m>
+                  <m:oMathPara xmlns:m="http://schemas.openxmlformats.org/officeDocument/2006/math">
+                    <m:oMathParaPr>
+                      <m:jc m:val="centerGroup"/>
+                    </m:oMathParaPr>
+                    <m:oMath xmlns:m="http://schemas.openxmlformats.org/officeDocument/2006/math">
+                      <m:nary>
+                        <m:naryPr>
+                          <m:chr m:val="∑"/>
+                          <m:limLoc m:val="undOvr"/>
+                          <m:ctrlPr>
+                            <a:rPr lang="el-GR" sz="2400" i="1" kern="100">
+                              <a:solidFill>
+                                <a:schemeClr val="bg1"/>
+                              </a:solidFill>
+                              <a:effectLst/>
+                              <a:latin typeface="Cambria Math" panose="02040503050406030204" pitchFamily="18" charset="0"/>
+                              <a:ea typeface="Times New Roman" panose="02020603050405020304" pitchFamily="18" charset="0"/>
+                              <a:cs typeface="Times New Roman" panose="02020603050405020304" pitchFamily="18" charset="0"/>
+                            </a:rPr>
+                          </m:ctrlPr>
+                        </m:naryPr>
+                        <m:sub>
+                          <m:r>
+                            <a:rPr lang="en-US" sz="2400" i="1" kern="100">
+                              <a:solidFill>
+                                <a:schemeClr val="bg1"/>
+                              </a:solidFill>
+                              <a:effectLst/>
+                              <a:latin typeface="Cambria Math" panose="02040503050406030204" pitchFamily="18" charset="0"/>
+                              <a:ea typeface="Times New Roman" panose="02020603050405020304" pitchFamily="18" charset="0"/>
+                              <a:cs typeface="Times New Roman" panose="02020603050405020304" pitchFamily="18" charset="0"/>
+                            </a:rPr>
+                            <m:t>𝑗</m:t>
+                          </m:r>
+                          <m:r>
+                            <a:rPr lang="el-GR" sz="2400" i="1" kern="100">
+                              <a:solidFill>
+                                <a:schemeClr val="bg1"/>
+                              </a:solidFill>
+                              <a:effectLst/>
+                              <a:latin typeface="Cambria Math" panose="02040503050406030204" pitchFamily="18" charset="0"/>
+                              <a:ea typeface="Times New Roman" panose="02020603050405020304" pitchFamily="18" charset="0"/>
+                              <a:cs typeface="Times New Roman" panose="02020603050405020304" pitchFamily="18" charset="0"/>
+                            </a:rPr>
+                            <m:t>=1</m:t>
+                          </m:r>
+                        </m:sub>
+                        <m:sup>
+                          <m:r>
+                            <a:rPr lang="el-GR" sz="2400" i="1" kern="100">
+                              <a:solidFill>
+                                <a:schemeClr val="bg1"/>
+                              </a:solidFill>
+                              <a:effectLst/>
+                              <a:latin typeface="Cambria Math" panose="02040503050406030204" pitchFamily="18" charset="0"/>
+                              <a:ea typeface="Times New Roman" panose="02020603050405020304" pitchFamily="18" charset="0"/>
+                              <a:cs typeface="Times New Roman" panose="02020603050405020304" pitchFamily="18" charset="0"/>
+                            </a:rPr>
+                            <m:t>𝑛</m:t>
+                          </m:r>
+                        </m:sup>
+                        <m:e>
+                          <m:r>
+                            <a:rPr lang="el-GR" sz="2400" i="1" kern="100">
+                              <a:solidFill>
+                                <a:schemeClr val="bg1"/>
+                              </a:solidFill>
+                              <a:effectLst/>
+                              <a:latin typeface="Cambria Math" panose="02040503050406030204" pitchFamily="18" charset="0"/>
+                              <a:ea typeface="Times New Roman" panose="02020603050405020304" pitchFamily="18" charset="0"/>
+                              <a:cs typeface="Times New Roman" panose="02020603050405020304" pitchFamily="18" charset="0"/>
+                            </a:rPr>
+                            <m:t>(</m:t>
+                          </m:r>
+                          <m:sSub>
+                            <m:sSubPr>
+                              <m:ctrlPr>
+                                <a:rPr lang="el-GR" sz="2400" i="1" kern="100">
+                                  <a:solidFill>
+                                    <a:schemeClr val="bg1"/>
+                                  </a:solidFill>
+                                  <a:effectLst/>
+                                  <a:latin typeface="Cambria Math" panose="02040503050406030204" pitchFamily="18" charset="0"/>
+                                  <a:ea typeface="Times New Roman" panose="02020603050405020304" pitchFamily="18" charset="0"/>
+                                  <a:cs typeface="Times New Roman" panose="02020603050405020304" pitchFamily="18" charset="0"/>
+                                </a:rPr>
+                              </m:ctrlPr>
+                            </m:sSubPr>
+                            <m:e>
+                              <m:r>
+                                <a:rPr lang="el-GR" sz="2400" i="1" kern="100">
+                                  <a:solidFill>
+                                    <a:schemeClr val="bg1"/>
+                                  </a:solidFill>
+                                  <a:effectLst/>
+                                  <a:latin typeface="Cambria Math" panose="02040503050406030204" pitchFamily="18" charset="0"/>
+                                  <a:ea typeface="Times New Roman" panose="02020603050405020304" pitchFamily="18" charset="0"/>
+                                  <a:cs typeface="Times New Roman" panose="02020603050405020304" pitchFamily="18" charset="0"/>
+                                </a:rPr>
+                                <m:t>𝑥</m:t>
+                              </m:r>
+                            </m:e>
+                            <m:sub>
+                              <m:r>
+                                <a:rPr lang="el-GR" sz="2400" i="1" kern="100">
+                                  <a:solidFill>
+                                    <a:schemeClr val="bg1"/>
+                                  </a:solidFill>
+                                  <a:effectLst/>
+                                  <a:latin typeface="Cambria Math" panose="02040503050406030204" pitchFamily="18" charset="0"/>
+                                  <a:ea typeface="Times New Roman" panose="02020603050405020304" pitchFamily="18" charset="0"/>
+                                  <a:cs typeface="Times New Roman" panose="02020603050405020304" pitchFamily="18" charset="0"/>
+                                </a:rPr>
+                                <m:t>𝑖</m:t>
+                              </m:r>
+                              <m:r>
+                                <a:rPr lang="el-GR" sz="2400" i="1" kern="100">
+                                  <a:solidFill>
+                                    <a:schemeClr val="bg1"/>
+                                  </a:solidFill>
+                                  <a:effectLst/>
+                                  <a:latin typeface="Cambria Math" panose="02040503050406030204" pitchFamily="18" charset="0"/>
+                                  <a:ea typeface="Times New Roman" panose="02020603050405020304" pitchFamily="18" charset="0"/>
+                                  <a:cs typeface="Times New Roman" panose="02020603050405020304" pitchFamily="18" charset="0"/>
+                                </a:rPr>
+                                <m:t>,</m:t>
+                              </m:r>
+                              <m:r>
+                                <a:rPr lang="en-US" sz="2400" i="1" kern="100">
+                                  <a:solidFill>
+                                    <a:schemeClr val="bg1"/>
+                                  </a:solidFill>
+                                  <a:effectLst/>
+                                  <a:latin typeface="Cambria Math" panose="02040503050406030204" pitchFamily="18" charset="0"/>
+                                  <a:ea typeface="Times New Roman" panose="02020603050405020304" pitchFamily="18" charset="0"/>
+                                  <a:cs typeface="Times New Roman" panose="02020603050405020304" pitchFamily="18" charset="0"/>
+                                </a:rPr>
+                                <m:t>𝑗</m:t>
+                              </m:r>
+                              <m:r>
+                                <a:rPr lang="el-GR" sz="2400" i="1" kern="100">
+                                  <a:solidFill>
+                                    <a:schemeClr val="bg1"/>
+                                  </a:solidFill>
+                                  <a:effectLst/>
+                                  <a:latin typeface="Cambria Math" panose="02040503050406030204" pitchFamily="18" charset="0"/>
+                                  <a:ea typeface="Times New Roman" panose="02020603050405020304" pitchFamily="18" charset="0"/>
+                                  <a:cs typeface="Times New Roman" panose="02020603050405020304" pitchFamily="18" charset="0"/>
+                                </a:rPr>
+                                <m:t>,</m:t>
+                              </m:r>
+                              <m:r>
+                                <a:rPr lang="en-US" sz="2400" i="1" kern="100">
+                                  <a:solidFill>
+                                    <a:schemeClr val="bg1"/>
+                                  </a:solidFill>
+                                  <a:effectLst/>
+                                  <a:latin typeface="Cambria Math" panose="02040503050406030204" pitchFamily="18" charset="0"/>
+                                  <a:ea typeface="Times New Roman" panose="02020603050405020304" pitchFamily="18" charset="0"/>
+                                  <a:cs typeface="Times New Roman" panose="02020603050405020304" pitchFamily="18" charset="0"/>
+                                </a:rPr>
+                                <m:t>𝑘</m:t>
+                              </m:r>
+                            </m:sub>
+                          </m:sSub>
+                          <m:r>
+                            <a:rPr lang="el-GR" sz="2400" i="1" kern="100">
+                              <a:solidFill>
+                                <a:schemeClr val="bg1"/>
+                              </a:solidFill>
+                              <a:effectLst/>
+                              <a:latin typeface="Cambria Math" panose="02040503050406030204" pitchFamily="18" charset="0"/>
+                              <a:ea typeface="Times New Roman" panose="02020603050405020304" pitchFamily="18" charset="0"/>
+                              <a:cs typeface="Times New Roman" panose="02020603050405020304" pitchFamily="18" charset="0"/>
+                            </a:rPr>
+                            <m:t>+</m:t>
+                          </m:r>
+                          <m:sSub>
+                            <m:sSubPr>
+                              <m:ctrlPr>
+                                <a:rPr lang="el-GR" sz="2400" i="1" kern="100">
+                                  <a:solidFill>
+                                    <a:schemeClr val="bg1"/>
+                                  </a:solidFill>
+                                  <a:effectLst/>
+                                  <a:latin typeface="Cambria Math" panose="02040503050406030204" pitchFamily="18" charset="0"/>
+                                  <a:ea typeface="Times New Roman" panose="02020603050405020304" pitchFamily="18" charset="0"/>
+                                  <a:cs typeface="Times New Roman" panose="02020603050405020304" pitchFamily="18" charset="0"/>
+                                </a:rPr>
+                              </m:ctrlPr>
+                            </m:sSubPr>
+                            <m:e>
+                              <m:r>
+                                <a:rPr lang="en-US" sz="2400" i="1" kern="100">
+                                  <a:solidFill>
+                                    <a:schemeClr val="bg1"/>
+                                  </a:solidFill>
+                                  <a:effectLst/>
+                                  <a:latin typeface="Cambria Math" panose="02040503050406030204" pitchFamily="18" charset="0"/>
+                                  <a:ea typeface="Times New Roman" panose="02020603050405020304" pitchFamily="18" charset="0"/>
+                                  <a:cs typeface="Times New Roman" panose="02020603050405020304" pitchFamily="18" charset="0"/>
+                                </a:rPr>
+                                <m:t>𝑥</m:t>
+                              </m:r>
+                            </m:e>
+                            <m:sub>
+                              <m:r>
+                                <a:rPr lang="en-US" sz="2400" i="1" kern="100">
+                                  <a:solidFill>
+                                    <a:schemeClr val="bg1"/>
+                                  </a:solidFill>
+                                  <a:effectLst/>
+                                  <a:latin typeface="Cambria Math" panose="02040503050406030204" pitchFamily="18" charset="0"/>
+                                  <a:ea typeface="Times New Roman" panose="02020603050405020304" pitchFamily="18" charset="0"/>
+                                  <a:cs typeface="Times New Roman" panose="02020603050405020304" pitchFamily="18" charset="0"/>
+                                </a:rPr>
+                                <m:t>𝑗</m:t>
+                              </m:r>
+                              <m:r>
+                                <a:rPr lang="el-GR" sz="2400" i="1" kern="100">
+                                  <a:solidFill>
+                                    <a:schemeClr val="bg1"/>
+                                  </a:solidFill>
+                                  <a:effectLst/>
+                                  <a:latin typeface="Cambria Math" panose="02040503050406030204" pitchFamily="18" charset="0"/>
+                                  <a:ea typeface="Times New Roman" panose="02020603050405020304" pitchFamily="18" charset="0"/>
+                                  <a:cs typeface="Times New Roman" panose="02020603050405020304" pitchFamily="18" charset="0"/>
+                                </a:rPr>
+                                <m:t>,</m:t>
+                              </m:r>
+                              <m:r>
+                                <a:rPr lang="en-US" sz="2400" i="1" kern="100">
+                                  <a:solidFill>
+                                    <a:schemeClr val="bg1"/>
+                                  </a:solidFill>
+                                  <a:effectLst/>
+                                  <a:latin typeface="Cambria Math" panose="02040503050406030204" pitchFamily="18" charset="0"/>
+                                  <a:ea typeface="Times New Roman" panose="02020603050405020304" pitchFamily="18" charset="0"/>
+                                  <a:cs typeface="Times New Roman" panose="02020603050405020304" pitchFamily="18" charset="0"/>
+                                </a:rPr>
+                                <m:t>𝑖</m:t>
+                              </m:r>
+                              <m:r>
+                                <a:rPr lang="el-GR" sz="2400" i="1" kern="100">
+                                  <a:solidFill>
+                                    <a:schemeClr val="bg1"/>
+                                  </a:solidFill>
+                                  <a:effectLst/>
+                                  <a:latin typeface="Cambria Math" panose="02040503050406030204" pitchFamily="18" charset="0"/>
+                                  <a:ea typeface="Times New Roman" panose="02020603050405020304" pitchFamily="18" charset="0"/>
+                                  <a:cs typeface="Times New Roman" panose="02020603050405020304" pitchFamily="18" charset="0"/>
+                                </a:rPr>
+                                <m:t>,</m:t>
+                              </m:r>
+                              <m:r>
+                                <a:rPr lang="en-US" sz="2400" i="1" kern="100">
+                                  <a:solidFill>
+                                    <a:schemeClr val="bg1"/>
+                                  </a:solidFill>
+                                  <a:effectLst/>
+                                  <a:latin typeface="Cambria Math" panose="02040503050406030204" pitchFamily="18" charset="0"/>
+                                  <a:ea typeface="Times New Roman" panose="02020603050405020304" pitchFamily="18" charset="0"/>
+                                  <a:cs typeface="Times New Roman" panose="02020603050405020304" pitchFamily="18" charset="0"/>
+                                </a:rPr>
+                                <m:t>𝑘</m:t>
+                              </m:r>
+                            </m:sub>
+                          </m:sSub>
+                          <m:r>
+                            <a:rPr lang="el-GR" sz="2400" i="1" kern="100">
+                              <a:solidFill>
+                                <a:schemeClr val="bg1"/>
+                              </a:solidFill>
+                              <a:effectLst/>
+                              <a:latin typeface="Cambria Math" panose="02040503050406030204" pitchFamily="18" charset="0"/>
+                              <a:ea typeface="Times New Roman" panose="02020603050405020304" pitchFamily="18" charset="0"/>
+                              <a:cs typeface="Times New Roman" panose="02020603050405020304" pitchFamily="18" charset="0"/>
+                            </a:rPr>
+                            <m:t>)=1</m:t>
+                          </m:r>
+                        </m:e>
+                      </m:nary>
+                    </m:oMath>
+                  </m:oMathPara>
+                </a14:m>
+                <a:endParaRPr lang="el-GR" sz="2400" kern="100" dirty="0">
+                  <a:solidFill>
+                    <a:schemeClr val="bg1"/>
+                  </a:solidFill>
+                  <a:effectLst/>
+                  <a:latin typeface="Aptos" panose="020B0004020202020204" pitchFamily="34" charset="0"/>
+                  <a:ea typeface="Aptos" panose="020B0004020202020204" pitchFamily="34" charset="0"/>
+                  <a:cs typeface="Times New Roman" panose="02020603050405020304" pitchFamily="18" charset="0"/>
+                </a:endParaRPr>
+              </a:p>
+              <a:p>
+                <a:pPr indent="0" algn="ctr">
+                  <a:lnSpc>
+                    <a:spcPct val="107000"/>
+                  </a:lnSpc>
+                  <a:spcAft>
+                    <a:spcPts val="800"/>
+                  </a:spcAft>
+                  <a:buNone/>
+                  <a:tabLst>
+                    <a:tab pos="5274310" algn="r"/>
+                  </a:tabLst>
+                </a:pPr>
+                <a14:m>
+                  <m:oMathPara xmlns:m="http://schemas.openxmlformats.org/officeDocument/2006/math">
+                    <m:oMathParaPr>
+                      <m:jc m:val="centerGroup"/>
+                    </m:oMathParaPr>
+                    <m:oMath xmlns:m="http://schemas.openxmlformats.org/officeDocument/2006/math">
+                      <m:r>
+                        <a:rPr lang="el-GR" sz="2400" i="1" kern="100">
+                          <a:solidFill>
+                            <a:schemeClr val="bg1"/>
+                          </a:solidFill>
+                          <a:effectLst/>
+                          <a:latin typeface="Cambria Math" panose="02040503050406030204" pitchFamily="18" charset="0"/>
+                          <a:ea typeface="Times New Roman" panose="02020603050405020304" pitchFamily="18" charset="0"/>
+                          <a:cs typeface="Times New Roman" panose="02020603050405020304" pitchFamily="18" charset="0"/>
+                        </a:rPr>
+                        <m:t>𝑗</m:t>
+                      </m:r>
+                      <m:r>
+                        <a:rPr lang="en-US" sz="2400" i="1" kern="100">
+                          <a:solidFill>
+                            <a:schemeClr val="bg1"/>
+                          </a:solidFill>
+                          <a:effectLst/>
+                          <a:latin typeface="Cambria Math" panose="02040503050406030204" pitchFamily="18" charset="0"/>
+                          <a:ea typeface="Times New Roman" panose="02020603050405020304" pitchFamily="18" charset="0"/>
+                          <a:cs typeface="Times New Roman" panose="02020603050405020304" pitchFamily="18" charset="0"/>
+                        </a:rPr>
+                        <m:t>,</m:t>
+                      </m:r>
+                      <m:r>
+                        <a:rPr lang="en-US" sz="2400" i="1" kern="100">
+                          <a:solidFill>
+                            <a:schemeClr val="bg1"/>
+                          </a:solidFill>
+                          <a:effectLst/>
+                          <a:latin typeface="Cambria Math" panose="02040503050406030204" pitchFamily="18" charset="0"/>
+                          <a:ea typeface="Times New Roman" panose="02020603050405020304" pitchFamily="18" charset="0"/>
+                          <a:cs typeface="Times New Roman" panose="02020603050405020304" pitchFamily="18" charset="0"/>
+                        </a:rPr>
+                        <m:t>𝑖</m:t>
+                      </m:r>
+                      <m:r>
+                        <a:rPr lang="en-US" sz="2400" i="1" kern="100">
+                          <a:solidFill>
+                            <a:schemeClr val="bg1"/>
+                          </a:solidFill>
+                          <a:effectLst/>
+                          <a:latin typeface="Cambria Math" panose="02040503050406030204" pitchFamily="18" charset="0"/>
+                          <a:ea typeface="Times New Roman" panose="02020603050405020304" pitchFamily="18" charset="0"/>
+                          <a:cs typeface="Times New Roman" panose="02020603050405020304" pitchFamily="18" charset="0"/>
+                        </a:rPr>
+                        <m:t>=1,2,3....</m:t>
+                      </m:r>
+                      <m:r>
+                        <a:rPr lang="en-US" sz="2400" i="1" kern="100">
+                          <a:solidFill>
+                            <a:schemeClr val="bg1"/>
+                          </a:solidFill>
+                          <a:effectLst/>
+                          <a:latin typeface="Cambria Math" panose="02040503050406030204" pitchFamily="18" charset="0"/>
+                          <a:ea typeface="Times New Roman" panose="02020603050405020304" pitchFamily="18" charset="0"/>
+                          <a:cs typeface="Times New Roman" panose="02020603050405020304" pitchFamily="18" charset="0"/>
+                        </a:rPr>
+                        <m:t>𝑛</m:t>
+                      </m:r>
+                      <m:r>
+                        <a:rPr lang="en-US" sz="2400" i="1" kern="100">
+                          <a:solidFill>
+                            <a:schemeClr val="bg1"/>
+                          </a:solidFill>
+                          <a:effectLst/>
+                          <a:latin typeface="Cambria Math" panose="02040503050406030204" pitchFamily="18" charset="0"/>
+                          <a:ea typeface="Times New Roman" panose="02020603050405020304" pitchFamily="18" charset="0"/>
+                          <a:cs typeface="Times New Roman" panose="02020603050405020304" pitchFamily="18" charset="0"/>
+                        </a:rPr>
+                        <m:t>    </m:t>
+                      </m:r>
+                      <m:r>
+                        <a:rPr lang="en-US" sz="2400" i="1" kern="100">
+                          <a:solidFill>
+                            <a:schemeClr val="bg1"/>
+                          </a:solidFill>
+                          <a:effectLst/>
+                          <a:latin typeface="Cambria Math" panose="02040503050406030204" pitchFamily="18" charset="0"/>
+                          <a:ea typeface="Times New Roman" panose="02020603050405020304" pitchFamily="18" charset="0"/>
+                          <a:cs typeface="Times New Roman" panose="02020603050405020304" pitchFamily="18" charset="0"/>
+                        </a:rPr>
+                        <m:t>𝑘</m:t>
+                      </m:r>
+                      <m:r>
+                        <a:rPr lang="en-US" sz="2400" i="1" kern="100">
+                          <a:solidFill>
+                            <a:schemeClr val="bg1"/>
+                          </a:solidFill>
+                          <a:effectLst/>
+                          <a:latin typeface="Cambria Math" panose="02040503050406030204" pitchFamily="18" charset="0"/>
+                          <a:ea typeface="Times New Roman" panose="02020603050405020304" pitchFamily="18" charset="0"/>
+                          <a:cs typeface="Times New Roman" panose="02020603050405020304" pitchFamily="18" charset="0"/>
+                        </a:rPr>
+                        <m:t> =1,2,3.....2(</m:t>
+                      </m:r>
+                      <m:r>
+                        <a:rPr lang="en-US" sz="2400" i="1" kern="100">
+                          <a:solidFill>
+                            <a:schemeClr val="bg1"/>
+                          </a:solidFill>
+                          <a:effectLst/>
+                          <a:latin typeface="Cambria Math" panose="02040503050406030204" pitchFamily="18" charset="0"/>
+                          <a:ea typeface="Times New Roman" panose="02020603050405020304" pitchFamily="18" charset="0"/>
+                          <a:cs typeface="Times New Roman" panose="02020603050405020304" pitchFamily="18" charset="0"/>
+                        </a:rPr>
+                        <m:t>𝑛</m:t>
+                      </m:r>
+                      <m:r>
+                        <a:rPr lang="en-US" sz="2400" i="1" kern="100">
+                          <a:solidFill>
+                            <a:schemeClr val="bg1"/>
+                          </a:solidFill>
+                          <a:effectLst/>
+                          <a:latin typeface="Cambria Math" panose="02040503050406030204" pitchFamily="18" charset="0"/>
+                          <a:ea typeface="Times New Roman" panose="02020603050405020304" pitchFamily="18" charset="0"/>
+                          <a:cs typeface="Times New Roman" panose="02020603050405020304" pitchFamily="18" charset="0"/>
+                        </a:rPr>
+                        <m:t>−1) </m:t>
+                      </m:r>
+                    </m:oMath>
+                  </m:oMathPara>
+                </a14:m>
+                <a:endParaRPr lang="el-GR" sz="2400" kern="100" dirty="0">
+                  <a:solidFill>
+                    <a:schemeClr val="bg1"/>
+                  </a:solidFill>
+                  <a:effectLst/>
+                  <a:latin typeface="Aptos" panose="020B0004020202020204" pitchFamily="34" charset="0"/>
+                  <a:ea typeface="Aptos" panose="020B0004020202020204" pitchFamily="34" charset="0"/>
+                  <a:cs typeface="Times New Roman" panose="02020603050405020304" pitchFamily="18" charset="0"/>
+                </a:endParaRPr>
+              </a:p>
+              <a:p>
+                <a:pPr indent="0" algn="ctr">
+                  <a:lnSpc>
+                    <a:spcPct val="107000"/>
+                  </a:lnSpc>
+                  <a:spcAft>
+                    <a:spcPts val="800"/>
+                  </a:spcAft>
+                  <a:buNone/>
+                  <a:tabLst>
+                    <a:tab pos="5274310" algn="r"/>
+                  </a:tabLst>
+                </a:pPr>
+                <a:endParaRPr lang="el-GR" sz="1800" kern="100" dirty="0">
+                  <a:solidFill>
+                    <a:schemeClr val="bg1"/>
+                  </a:solidFill>
+                  <a:effectLst/>
+                  <a:latin typeface="Aptos" panose="020B0004020202020204" pitchFamily="34" charset="0"/>
+                  <a:ea typeface="Aptos" panose="020B0004020202020204" pitchFamily="34" charset="0"/>
+                  <a:cs typeface="Times New Roman" panose="02020603050405020304" pitchFamily="18" charset="0"/>
+                </a:endParaRPr>
+              </a:p>
+              <a:p>
+                <a:pPr marL="0" indent="0">
+                  <a:buNone/>
+                </a:pPr>
+                <a:endParaRPr lang="el-GR" dirty="0">
+                  <a:solidFill>
+                    <a:schemeClr val="bg1"/>
+                  </a:solidFill>
+                </a:endParaRPr>
+              </a:p>
+            </p:txBody>
+          </p:sp>
+        </mc:Choice>
+        <mc:Fallback xmlns="">
+          <p:sp>
+            <p:nvSpPr>
+              <p:cNvPr id="3" name="Θέση περιεχομένου 2">
+                <a:extLst>
+                  <a:ext uri="{FF2B5EF4-FFF2-40B4-BE49-F238E27FC236}">
+                    <a16:creationId xmlns:a16="http://schemas.microsoft.com/office/drawing/2014/main" id="{3E06C2F6-D0AB-64DE-E24F-BD4DA26DB27C}"/>
+                  </a:ext>
+                </a:extLst>
+              </p:cNvPr>
+              <p:cNvSpPr>
+                <a:spLocks noGrp="1" noRot="1" noChangeAspect="1" noMove="1" noResize="1" noEditPoints="1" noAdjustHandles="1" noChangeArrowheads="1" noChangeShapeType="1" noTextEdit="1"/>
+              </p:cNvSpPr>
+              <p:nvPr>
+                <p:ph idx="1"/>
+              </p:nvPr>
+            </p:nvSpPr>
+            <p:spPr>
+              <a:blipFill>
+                <a:blip r:embed="rId2"/>
+                <a:stretch>
+                  <a:fillRect l="-1217" t="-1120"/>
+                </a:stretch>
+              </a:blipFill>
+            </p:spPr>
+            <p:txBody>
+              <a:bodyPr/>
+              <a:lstStyle/>
+              <a:p>
+                <a:r>
+                  <a:rPr lang="el-GR">
+                    <a:noFill/>
+                  </a:rPr>
+                  <a:t> </a:t>
+                </a:r>
+              </a:p>
+            </p:txBody>
+          </p:sp>
+        </mc:Fallback>
+      </mc:AlternateContent>
+      <p:pic>
+        <p:nvPicPr>
+          <p:cNvPr id="5" name="Εικόνα 4">
+            <a:extLst>
+              <a:ext uri="{FF2B5EF4-FFF2-40B4-BE49-F238E27FC236}">
+                <a16:creationId xmlns:a16="http://schemas.microsoft.com/office/drawing/2014/main" id="{B2D4EA56-A822-54F5-1106-1A8DF04293C1}"/>
+              </a:ext>
+            </a:extLst>
+          </p:cNvPr>
+          <p:cNvPicPr>
+            <a:picLocks noChangeAspect="1"/>
+          </p:cNvPicPr>
+          <p:nvPr/>
+        </p:nvPicPr>
+        <p:blipFill>
+          <a:blip r:embed="rId3"/>
+          <a:stretch>
+            <a:fillRect/>
+          </a:stretch>
+        </p:blipFill>
+        <p:spPr>
+          <a:xfrm>
+            <a:off x="555559" y="4610810"/>
+            <a:ext cx="10885613" cy="1566153"/>
+          </a:xfrm>
+          <a:prstGeom prst="rect">
+            <a:avLst/>
+          </a:prstGeom>
+        </p:spPr>
+      </p:pic>
+    </p:spTree>
+    <p:extLst>
+      <p:ext uri="{BB962C8B-B14F-4D97-AF65-F5344CB8AC3E}">
+        <p14:creationId xmlns:p14="http://schemas.microsoft.com/office/powerpoint/2010/main" val="538614269"/>
+      </p:ext>
+    </p:extLst>
+  </p:cSld>
+  <p:clrMapOvr>
+    <a:masterClrMapping/>
+  </p:clrMapOvr>
+</p:sld>
+</file>
+
+<file path=ppt/slides/slide11.xml><?xml version="1.0" encoding="utf-8"?>
 <p:sld xmlns:a="http://schemas.openxmlformats.org/drawingml/2006/main" xmlns:r="http://schemas.openxmlformats.org/officeDocument/2006/relationships" xmlns:p="http://schemas.openxmlformats.org/presentationml/2006/main">
   <p:cSld>
     <p:spTree>
@@ -4213,7 +4935,7 @@
 </p:sld>
 </file>
 
-<file path=ppt/slides/slide11.xml><?xml version="1.0" encoding="utf-8"?>
+<file path=ppt/slides/slide12.xml><?xml version="1.0" encoding="utf-8"?>
 <p:sld xmlns:a="http://schemas.openxmlformats.org/drawingml/2006/main" xmlns:r="http://schemas.openxmlformats.org/officeDocument/2006/relationships" xmlns:p="http://schemas.openxmlformats.org/presentationml/2006/main">
   <p:cSld>
     <p:spTree>
@@ -5248,7 +5970,7 @@
 </p:sld>
 </file>
 
-<file path=ppt/slides/slide12.xml><?xml version="1.0" encoding="utf-8"?>
+<file path=ppt/slides/slide13.xml><?xml version="1.0" encoding="utf-8"?>
 <p:sld xmlns:a="http://schemas.openxmlformats.org/drawingml/2006/main" xmlns:r="http://schemas.openxmlformats.org/officeDocument/2006/relationships" xmlns:p="http://schemas.openxmlformats.org/presentationml/2006/main">
   <p:cSld>
     <p:spTree>
@@ -5862,7 +6584,7 @@
 </p:sld>
 </file>
 
-<file path=ppt/slides/slide13.xml><?xml version="1.0" encoding="utf-8"?>
+<file path=ppt/slides/slide14.xml><?xml version="1.0" encoding="utf-8"?>
 <p:sld xmlns:a="http://schemas.openxmlformats.org/drawingml/2006/main" xmlns:r="http://schemas.openxmlformats.org/officeDocument/2006/relationships" xmlns:p="http://schemas.openxmlformats.org/presentationml/2006/main">
   <p:cSld>
     <p:spTree>
@@ -6689,7 +7411,7 @@
 </p:sld>
 </file>
 
-<file path=ppt/slides/slide14.xml><?xml version="1.0" encoding="utf-8"?>
+<file path=ppt/slides/slide15.xml><?xml version="1.0" encoding="utf-8"?>
 <p:sld xmlns:a="http://schemas.openxmlformats.org/drawingml/2006/main" xmlns:r="http://schemas.openxmlformats.org/officeDocument/2006/relationships" xmlns:p="http://schemas.openxmlformats.org/presentationml/2006/main">
   <p:cSld>
     <p:spTree>
@@ -7459,7 +8181,7 @@
 </p:sld>
 </file>
 
-<file path=ppt/slides/slide15.xml><?xml version="1.0" encoding="utf-8"?>
+<file path=ppt/slides/slide16.xml><?xml version="1.0" encoding="utf-8"?>
 <p:sld xmlns:a="http://schemas.openxmlformats.org/drawingml/2006/main" xmlns:r="http://schemas.openxmlformats.org/officeDocument/2006/relationships" xmlns:p="http://schemas.openxmlformats.org/presentationml/2006/main">
   <p:cSld>
     <p:spTree>
@@ -8751,7 +9473,7 @@
 </p:sld>
 </file>
 
-<file path=ppt/slides/slide16.xml><?xml version="1.0" encoding="utf-8"?>
+<file path=ppt/slides/slide17.xml><?xml version="1.0" encoding="utf-8"?>
 <p:sld xmlns:a="http://schemas.openxmlformats.org/drawingml/2006/main" xmlns:r="http://schemas.openxmlformats.org/officeDocument/2006/relationships" xmlns:p="http://schemas.openxmlformats.org/presentationml/2006/main">
   <p:cSld>
     <p:spTree>
@@ -10214,7 +10936,7 @@
 </p:sld>
 </file>
 
-<file path=ppt/slides/slide17.xml><?xml version="1.0" encoding="utf-8"?>
+<file path=ppt/slides/slide18.xml><?xml version="1.0" encoding="utf-8"?>
 <p:sld xmlns:a="http://schemas.openxmlformats.org/drawingml/2006/main" xmlns:r="http://schemas.openxmlformats.org/officeDocument/2006/relationships" xmlns:p="http://schemas.openxmlformats.org/presentationml/2006/main">
   <p:cSld>
     <p:spTree>
@@ -10387,7 +11109,7 @@
 </p:sld>
 </file>
 
-<file path=ppt/slides/slide18.xml><?xml version="1.0" encoding="utf-8"?>
+<file path=ppt/slides/slide19.xml><?xml version="1.0" encoding="utf-8"?>
 <p:sld xmlns:a="http://schemas.openxmlformats.org/drawingml/2006/main" xmlns:r="http://schemas.openxmlformats.org/officeDocument/2006/relationships" xmlns:p="http://schemas.openxmlformats.org/presentationml/2006/main">
   <p:cSld>
     <p:spTree>
@@ -10629,106 +11351,6 @@
 </p:sld>
 </file>
 
-<file path=ppt/slides/slide19.xml><?xml version="1.0" encoding="utf-8"?>
-<p:sld xmlns:a="http://schemas.openxmlformats.org/drawingml/2006/main" xmlns:r="http://schemas.openxmlformats.org/officeDocument/2006/relationships" xmlns:p="http://schemas.openxmlformats.org/presentationml/2006/main">
-  <p:cSld>
-    <p:spTree>
-      <p:nvGrpSpPr>
-        <p:cNvPr id="1" name=""/>
-        <p:cNvGrpSpPr/>
-        <p:nvPr/>
-      </p:nvGrpSpPr>
-      <p:grpSpPr>
-        <a:xfrm>
-          <a:off x="0" y="0"/>
-          <a:ext cx="0" cy="0"/>
-          <a:chOff x="0" y="0"/>
-          <a:chExt cx="0" cy="0"/>
-        </a:xfrm>
-      </p:grpSpPr>
-      <p:sp>
-        <p:nvSpPr>
-          <p:cNvPr id="2" name="Τίτλος 1">
-            <a:extLst>
-              <a:ext uri="{FF2B5EF4-FFF2-40B4-BE49-F238E27FC236}">
-                <a16:creationId xmlns:a16="http://schemas.microsoft.com/office/drawing/2014/main" id="{9B384F9E-523E-9A0F-22A6-EF3536D5B2BD}"/>
-              </a:ext>
-            </a:extLst>
-          </p:cNvPr>
-          <p:cNvSpPr>
-            <a:spLocks noGrp="1"/>
-          </p:cNvSpPr>
-          <p:nvPr>
-            <p:ph type="title"/>
-          </p:nvPr>
-        </p:nvSpPr>
-        <p:spPr/>
-        <p:txBody>
-          <a:bodyPr/>
-          <a:lstStyle/>
-          <a:p>
-            <a:pPr algn="ctr"/>
-            <a:r>
-              <a:rPr lang="el-GR">
-                <a:solidFill>
-                  <a:schemeClr val="bg1"/>
-                </a:solidFill>
-              </a:rPr>
-              <a:t>ΧΡΟΝΟΣ</a:t>
-            </a:r>
-            <a:endParaRPr lang="el-GR" dirty="0">
-              <a:solidFill>
-                <a:schemeClr val="bg1"/>
-              </a:solidFill>
-            </a:endParaRPr>
-          </a:p>
-        </p:txBody>
-      </p:sp>
-      <p:pic>
-        <p:nvPicPr>
-          <p:cNvPr id="4" name="Θέση περιεχομένου 3" descr="Εικόνα που περιέχει κείμενο, γραμμή, γράφημα, διάγραμμα&#10;&#10;Περιγραφή που δημιουργήθηκε αυτόματα">
-            <a:extLst>
-              <a:ext uri="{FF2B5EF4-FFF2-40B4-BE49-F238E27FC236}">
-                <a16:creationId xmlns:a16="http://schemas.microsoft.com/office/drawing/2014/main" id="{9C423AC9-C56C-A979-67AB-37E1CDD19072}"/>
-              </a:ext>
-            </a:extLst>
-          </p:cNvPr>
-          <p:cNvPicPr>
-            <a:picLocks noGrp="1" noChangeAspect="1"/>
-          </p:cNvPicPr>
-          <p:nvPr>
-            <p:ph idx="1"/>
-          </p:nvPr>
-        </p:nvPicPr>
-        <p:blipFill>
-          <a:blip r:embed="rId2"/>
-          <a:stretch>
-            <a:fillRect/>
-          </a:stretch>
-        </p:blipFill>
-        <p:spPr>
-          <a:xfrm>
-            <a:off x="2475919" y="1342984"/>
-            <a:ext cx="6869249" cy="5291179"/>
-          </a:xfrm>
-          <a:prstGeom prst="rect">
-            <a:avLst/>
-          </a:prstGeom>
-        </p:spPr>
-      </p:pic>
-    </p:spTree>
-    <p:extLst>
-      <p:ext uri="{BB962C8B-B14F-4D97-AF65-F5344CB8AC3E}">
-        <p14:creationId xmlns:p14="http://schemas.microsoft.com/office/powerpoint/2010/main" val="3305517100"/>
-      </p:ext>
-    </p:extLst>
-  </p:cSld>
-  <p:clrMapOvr>
-    <a:masterClrMapping/>
-  </p:clrMapOvr>
-</p:sld>
-</file>
-
 <file path=ppt/slides/slide2.xml><?xml version="1.0" encoding="utf-8"?>
 <p:sld xmlns:a="http://schemas.openxmlformats.org/drawingml/2006/main" xmlns:r="http://schemas.openxmlformats.org/officeDocument/2006/relationships" xmlns:p="http://schemas.openxmlformats.org/presentationml/2006/main">
   <p:cSld>
@@ -10823,6 +11445,106 @@
 </file>
 
 <file path=ppt/slides/slide20.xml><?xml version="1.0" encoding="utf-8"?>
+<p:sld xmlns:a="http://schemas.openxmlformats.org/drawingml/2006/main" xmlns:r="http://schemas.openxmlformats.org/officeDocument/2006/relationships" xmlns:p="http://schemas.openxmlformats.org/presentationml/2006/main">
+  <p:cSld>
+    <p:spTree>
+      <p:nvGrpSpPr>
+        <p:cNvPr id="1" name=""/>
+        <p:cNvGrpSpPr/>
+        <p:nvPr/>
+      </p:nvGrpSpPr>
+      <p:grpSpPr>
+        <a:xfrm>
+          <a:off x="0" y="0"/>
+          <a:ext cx="0" cy="0"/>
+          <a:chOff x="0" y="0"/>
+          <a:chExt cx="0" cy="0"/>
+        </a:xfrm>
+      </p:grpSpPr>
+      <p:sp>
+        <p:nvSpPr>
+          <p:cNvPr id="2" name="Τίτλος 1">
+            <a:extLst>
+              <a:ext uri="{FF2B5EF4-FFF2-40B4-BE49-F238E27FC236}">
+                <a16:creationId xmlns:a16="http://schemas.microsoft.com/office/drawing/2014/main" id="{9B384F9E-523E-9A0F-22A6-EF3536D5B2BD}"/>
+              </a:ext>
+            </a:extLst>
+          </p:cNvPr>
+          <p:cNvSpPr>
+            <a:spLocks noGrp="1"/>
+          </p:cNvSpPr>
+          <p:nvPr>
+            <p:ph type="title"/>
+          </p:nvPr>
+        </p:nvSpPr>
+        <p:spPr/>
+        <p:txBody>
+          <a:bodyPr/>
+          <a:lstStyle/>
+          <a:p>
+            <a:pPr algn="ctr"/>
+            <a:r>
+              <a:rPr lang="el-GR">
+                <a:solidFill>
+                  <a:schemeClr val="bg1"/>
+                </a:solidFill>
+              </a:rPr>
+              <a:t>ΧΡΟΝΟΣ</a:t>
+            </a:r>
+            <a:endParaRPr lang="el-GR" dirty="0">
+              <a:solidFill>
+                <a:schemeClr val="bg1"/>
+              </a:solidFill>
+            </a:endParaRPr>
+          </a:p>
+        </p:txBody>
+      </p:sp>
+      <p:pic>
+        <p:nvPicPr>
+          <p:cNvPr id="4" name="Θέση περιεχομένου 3" descr="Εικόνα που περιέχει κείμενο, γραμμή, γράφημα, διάγραμμα&#10;&#10;Περιγραφή που δημιουργήθηκε αυτόματα">
+            <a:extLst>
+              <a:ext uri="{FF2B5EF4-FFF2-40B4-BE49-F238E27FC236}">
+                <a16:creationId xmlns:a16="http://schemas.microsoft.com/office/drawing/2014/main" id="{9C423AC9-C56C-A979-67AB-37E1CDD19072}"/>
+              </a:ext>
+            </a:extLst>
+          </p:cNvPr>
+          <p:cNvPicPr>
+            <a:picLocks noGrp="1" noChangeAspect="1"/>
+          </p:cNvPicPr>
+          <p:nvPr>
+            <p:ph idx="1"/>
+          </p:nvPr>
+        </p:nvPicPr>
+        <p:blipFill>
+          <a:blip r:embed="rId2"/>
+          <a:stretch>
+            <a:fillRect/>
+          </a:stretch>
+        </p:blipFill>
+        <p:spPr>
+          <a:xfrm>
+            <a:off x="2475919" y="1342984"/>
+            <a:ext cx="6869249" cy="5291179"/>
+          </a:xfrm>
+          <a:prstGeom prst="rect">
+            <a:avLst/>
+          </a:prstGeom>
+        </p:spPr>
+      </p:pic>
+    </p:spTree>
+    <p:extLst>
+      <p:ext uri="{BB962C8B-B14F-4D97-AF65-F5344CB8AC3E}">
+        <p14:creationId xmlns:p14="http://schemas.microsoft.com/office/powerpoint/2010/main" val="3305517100"/>
+      </p:ext>
+    </p:extLst>
+  </p:cSld>
+  <p:clrMapOvr>
+    <a:masterClrMapping/>
+  </p:clrMapOvr>
+</p:sld>
+</file>
+
+<file path=ppt/slides/slide21.xml><?xml version="1.0" encoding="utf-8"?>
 <p:sld xmlns:a="http://schemas.openxmlformats.org/drawingml/2006/main" xmlns:r="http://schemas.openxmlformats.org/officeDocument/2006/relationships" xmlns:p="http://schemas.openxmlformats.org/presentationml/2006/main">
   <p:cSld>
     <p:spTree>
@@ -11630,7 +12352,9 @@
         </p:nvSpPr>
         <p:spPr/>
         <p:txBody>
-          <a:bodyPr/>
+          <a:bodyPr>
+            <a:normAutofit fontScale="70000" lnSpcReduction="20000"/>
+          </a:bodyPr>
           <a:lstStyle/>
           <a:p>
             <a:pPr indent="0">
@@ -11643,12 +12367,11 @@
               </a:tabLst>
             </a:pPr>
             <a:r>
-              <a:rPr lang="el-GR" u="sng" kern="100" dirty="0">
+              <a:rPr lang="el-GR" sz="2900" u="sng" kern="100" dirty="0">
                 <a:solidFill>
                   <a:schemeClr val="bg1"/>
                 </a:solidFill>
                 <a:effectLst/>
-                <a:latin typeface="Aptos" panose="020B0004020202020204" pitchFamily="34" charset="0"/>
                 <a:ea typeface="Times New Roman" panose="02020603050405020304" pitchFamily="18" charset="0"/>
                 <a:cs typeface="Times New Roman" panose="02020603050405020304" pitchFamily="18" charset="0"/>
                 <a:hlinkClick r:id="rId2">
@@ -11661,12 +12384,11 @@
               </a:rPr>
               <a:t>https://www.legaseriea.it/en/media/serie-a/2023-2024-serie-a-schedule-criteria-and-restriction</a:t>
             </a:r>
-            <a:endParaRPr lang="el-GR" kern="100" dirty="0">
+            <a:endParaRPr lang="el-GR" sz="2900" kern="100" dirty="0">
               <a:solidFill>
                 <a:schemeClr val="bg1"/>
               </a:solidFill>
               <a:effectLst/>
-              <a:latin typeface="Aptos" panose="020B0004020202020204" pitchFamily="34" charset="0"/>
               <a:ea typeface="Aptos" panose="020B0004020202020204" pitchFamily="34" charset="0"/>
               <a:cs typeface="Times New Roman" panose="02020603050405020304" pitchFamily="18" charset="0"/>
             </a:endParaRPr>
@@ -11682,23 +12404,21 @@
               </a:tabLst>
             </a:pPr>
             <a:r>
-              <a:rPr lang="el-GR" kern="100" dirty="0">
+              <a:rPr lang="el-GR" sz="2900" kern="100" dirty="0">
                 <a:solidFill>
                   <a:schemeClr val="bg1"/>
                 </a:solidFill>
                 <a:effectLst/>
-                <a:latin typeface="Aptos" panose="020B0004020202020204" pitchFamily="34" charset="0"/>
                 <a:ea typeface="Times New Roman" panose="02020603050405020304" pitchFamily="18" charset="0"/>
                 <a:cs typeface="Times New Roman" panose="02020603050405020304" pitchFamily="18" charset="0"/>
               </a:rPr>
               <a:t> </a:t>
             </a:r>
-            <a:endParaRPr lang="el-GR" kern="100" dirty="0">
+            <a:endParaRPr lang="el-GR" sz="2900" kern="100" dirty="0">
               <a:solidFill>
                 <a:schemeClr val="bg1"/>
               </a:solidFill>
               <a:effectLst/>
-              <a:latin typeface="Aptos" panose="020B0004020202020204" pitchFamily="34" charset="0"/>
               <a:ea typeface="Aptos" panose="020B0004020202020204" pitchFamily="34" charset="0"/>
               <a:cs typeface="Times New Roman" panose="02020603050405020304" pitchFamily="18" charset="0"/>
             </a:endParaRPr>
@@ -11717,17 +12437,215 @@
               </a:tabLst>
             </a:pPr>
             <a:r>
-              <a:rPr lang="en-US" u="sng" kern="100" dirty="0">
+              <a:rPr lang="en-US" sz="2900" u="sng" kern="100" dirty="0">
+                <a:solidFill>
+                  <a:srgbClr val="467886"/>
+                </a:solidFill>
+                <a:effectLst/>
+                <a:ea typeface="Times New Roman" panose="02020603050405020304" pitchFamily="18" charset="0"/>
+                <a:cs typeface="Times New Roman" panose="02020603050405020304" pitchFamily="18" charset="0"/>
+                <a:hlinkClick r:id="rId3">
+                  <a:extLst>
+                    <a:ext uri="{A12FA001-AC4F-418D-AE19-62706E023703}">
+                      <ahyp:hlinkClr xmlns:ahyp="http://schemas.microsoft.com/office/drawing/2018/hyperlinkcolor" val="tx"/>
+                    </a:ext>
+                  </a:extLst>
+                </a:hlinkClick>
+              </a:rPr>
+              <a:t>https://www.legaseriea.it/en/media/serie-a/</a:t>
+            </a:r>
+            <a:r>
+              <a:rPr lang="en-US" sz="2900" u="sng" kern="100" dirty="0">
                 <a:solidFill>
                   <a:schemeClr val="bg1"/>
                 </a:solidFill>
                 <a:effectLst/>
-                <a:latin typeface="Aptos" panose="020B0004020202020204" pitchFamily="34" charset="0"/>
                 <a:ea typeface="Times New Roman" panose="02020603050405020304" pitchFamily="18" charset="0"/>
                 <a:cs typeface="Times New Roman" panose="02020603050405020304" pitchFamily="18" charset="0"/>
+                <a:hlinkClick r:id="rId3">
+                  <a:extLst>
+                    <a:ext uri="{A12FA001-AC4F-418D-AE19-62706E023703}">
+                      <ahyp:hlinkClr xmlns:ahyp="http://schemas.microsoft.com/office/drawing/2018/hyperlinkcolor" val="tx"/>
+                    </a:ext>
+                  </a:extLst>
+                </a:hlinkClick>
               </a:rPr>
-              <a:t>https://www.legaseriea.it/en/media/serie-a/criteria-to-be-followed-for-the-draw-of-the-serie-a-2024-2025-calendar</a:t>
+              <a:t>criteria-to-be-followed-for-the-draw-of-the-serie-a-2024-2025-calendar</a:t>
             </a:r>
+            <a:endParaRPr lang="el-GR" sz="2900" u="sng" kern="100" dirty="0">
+              <a:solidFill>
+                <a:schemeClr val="bg1"/>
+              </a:solidFill>
+              <a:effectLst/>
+              <a:ea typeface="Times New Roman" panose="02020603050405020304" pitchFamily="18" charset="0"/>
+              <a:cs typeface="Times New Roman" panose="02020603050405020304" pitchFamily="18" charset="0"/>
+            </a:endParaRPr>
+          </a:p>
+          <a:p>
+            <a:pPr indent="0">
+              <a:lnSpc>
+                <a:spcPct val="107000"/>
+              </a:lnSpc>
+              <a:spcAft>
+                <a:spcPts val="800"/>
+              </a:spcAft>
+              <a:buNone/>
+              <a:tabLst>
+                <a:tab pos="5274310" algn="r"/>
+              </a:tabLst>
+            </a:pPr>
+            <a:r>
+              <a:rPr lang="el-GR" sz="2900" dirty="0">
+                <a:solidFill>
+                  <a:schemeClr val="bg1"/>
+                </a:solidFill>
+              </a:rPr>
+              <a:t>Τεκμηρίωση της βιβλιοθήκης </a:t>
+            </a:r>
+            <a:r>
+              <a:rPr lang="el-GR" sz="2900" dirty="0" err="1">
+                <a:solidFill>
+                  <a:schemeClr val="bg1"/>
+                </a:solidFill>
+              </a:rPr>
+              <a:t>pulp</a:t>
+            </a:r>
+            <a:r>
+              <a:rPr lang="el-GR" sz="2900" dirty="0">
+                <a:solidFill>
+                  <a:schemeClr val="bg1"/>
+                </a:solidFill>
+              </a:rPr>
+              <a:t> που χρησιμοποιήθηκε για την επίλυση του προβλήματος</a:t>
+            </a:r>
+          </a:p>
+          <a:p>
+            <a:pPr indent="0">
+              <a:lnSpc>
+                <a:spcPct val="107000"/>
+              </a:lnSpc>
+              <a:spcAft>
+                <a:spcPts val="800"/>
+              </a:spcAft>
+              <a:buNone/>
+              <a:tabLst>
+                <a:tab pos="5274310" algn="r"/>
+              </a:tabLst>
+            </a:pPr>
+            <a:r>
+              <a:rPr lang="el-GR" sz="2900" dirty="0">
+                <a:solidFill>
+                  <a:schemeClr val="bg1"/>
+                </a:solidFill>
+              </a:rPr>
+              <a:t>https://pypi.org/project/PuLP/</a:t>
+            </a:r>
+          </a:p>
+          <a:p>
+            <a:pPr indent="0">
+              <a:lnSpc>
+                <a:spcPct val="107000"/>
+              </a:lnSpc>
+              <a:spcAft>
+                <a:spcPts val="800"/>
+              </a:spcAft>
+              <a:buNone/>
+              <a:tabLst>
+                <a:tab pos="5274310" algn="r"/>
+              </a:tabLst>
+            </a:pPr>
+            <a:endParaRPr lang="el-GR" sz="2900" dirty="0">
+              <a:solidFill>
+                <a:schemeClr val="bg1"/>
+              </a:solidFill>
+            </a:endParaRPr>
+          </a:p>
+          <a:p>
+            <a:pPr indent="0">
+              <a:lnSpc>
+                <a:spcPct val="107000"/>
+              </a:lnSpc>
+              <a:spcAft>
+                <a:spcPts val="800"/>
+              </a:spcAft>
+              <a:buNone/>
+              <a:tabLst>
+                <a:tab pos="5274310" algn="r"/>
+              </a:tabLst>
+            </a:pPr>
+            <a:r>
+              <a:rPr lang="el-GR" sz="2900" dirty="0">
+                <a:solidFill>
+                  <a:schemeClr val="bg1"/>
+                </a:solidFill>
+              </a:rPr>
+              <a:t>Διδακτικές διαφάνειες της κα. Δασκαλάκη, κ. </a:t>
+            </a:r>
+            <a:r>
+              <a:rPr lang="el-GR" sz="2900" dirty="0" err="1">
+                <a:solidFill>
+                  <a:schemeClr val="bg1"/>
+                </a:solidFill>
+              </a:rPr>
+              <a:t>Βαλουξή</a:t>
+            </a:r>
+            <a:r>
+              <a:rPr lang="el-GR" sz="2900" dirty="0">
+                <a:solidFill>
+                  <a:schemeClr val="bg1"/>
+                </a:solidFill>
+              </a:rPr>
+              <a:t> και κ. </a:t>
+            </a:r>
+            <a:r>
+              <a:rPr lang="el-GR" sz="2900" dirty="0" err="1">
+                <a:solidFill>
+                  <a:schemeClr val="bg1"/>
+                </a:solidFill>
+              </a:rPr>
+              <a:t>Πέππα</a:t>
+            </a:r>
+            <a:endParaRPr lang="el-GR" sz="2900" dirty="0">
+              <a:solidFill>
+                <a:schemeClr val="bg1"/>
+              </a:solidFill>
+            </a:endParaRPr>
+          </a:p>
+          <a:p>
+            <a:pPr indent="0">
+              <a:lnSpc>
+                <a:spcPct val="107000"/>
+              </a:lnSpc>
+              <a:spcAft>
+                <a:spcPts val="800"/>
+              </a:spcAft>
+              <a:buNone/>
+              <a:tabLst>
+                <a:tab pos="5274310" algn="r"/>
+              </a:tabLst>
+            </a:pPr>
+            <a:r>
+              <a:rPr lang="el-GR" sz="2900" dirty="0">
+                <a:solidFill>
+                  <a:schemeClr val="bg1"/>
+                </a:solidFill>
+              </a:rPr>
+              <a:t>https://eclass.upatras.gr/courses/EE916/</a:t>
+            </a:r>
+          </a:p>
+          <a:p>
+            <a:pPr indent="0">
+              <a:lnSpc>
+                <a:spcPct val="107000"/>
+              </a:lnSpc>
+              <a:spcAft>
+                <a:spcPts val="800"/>
+              </a:spcAft>
+              <a:buNone/>
+              <a:tabLst>
+                <a:tab pos="5274310" algn="r"/>
+              </a:tabLst>
+            </a:pPr>
             <a:endParaRPr lang="el-GR" dirty="0"/>
           </a:p>
         </p:txBody>
@@ -12903,7 +13821,7 @@
           <p:cNvPr id="2" name="Τίτλος 1">
             <a:extLst>
               <a:ext uri="{FF2B5EF4-FFF2-40B4-BE49-F238E27FC236}">
-                <a16:creationId xmlns:a16="http://schemas.microsoft.com/office/drawing/2014/main" id="{A50AA08C-B015-2B1B-C8AE-0401A678D833}"/>
+                <a16:creationId xmlns:a16="http://schemas.microsoft.com/office/drawing/2014/main" id="{9116E994-09D9-C3B7-60E3-D3D9EA145850}"/>
               </a:ext>
             </a:extLst>
           </p:cNvPr>
@@ -12926,673 +13844,71 @@
                   <a:schemeClr val="bg1"/>
                 </a:solidFill>
               </a:rPr>
-              <a:t>ΠΕΡΙΟΡΙΣΜΟΙ</a:t>
+              <a:t>ΠΕΡΙΟΡΙΣΜΟΙ ΠΟΥ ΑΓΝΟΗΘΗΚΑΝ</a:t>
             </a:r>
           </a:p>
         </p:txBody>
       </p:sp>
-      <mc:AlternateContent xmlns:mc="http://schemas.openxmlformats.org/markup-compatibility/2006" xmlns:a14="http://schemas.microsoft.com/office/drawing/2010/main">
-        <mc:Choice Requires="a14">
-          <p:sp>
-            <p:nvSpPr>
-              <p:cNvPr id="3" name="Θέση περιεχομένου 2">
-                <a:extLst>
-                  <a:ext uri="{FF2B5EF4-FFF2-40B4-BE49-F238E27FC236}">
-                    <a16:creationId xmlns:a16="http://schemas.microsoft.com/office/drawing/2014/main" id="{3E06C2F6-D0AB-64DE-E24F-BD4DA26DB27C}"/>
-                  </a:ext>
-                </a:extLst>
-              </p:cNvPr>
-              <p:cNvSpPr>
-                <a:spLocks noGrp="1"/>
-              </p:cNvSpPr>
-              <p:nvPr>
-                <p:ph idx="1"/>
-              </p:nvPr>
-            </p:nvSpPr>
-            <p:spPr/>
-            <p:txBody>
-              <a:bodyPr/>
-              <a:lstStyle/>
-              <a:p>
-                <a:pPr marL="0" lvl="0" indent="0">
-                  <a:lnSpc>
-                    <a:spcPct val="107000"/>
-                  </a:lnSpc>
-                  <a:buNone/>
-                  <a:tabLst>
-                    <a:tab pos="5274310" algn="r"/>
-                  </a:tabLst>
-                </a:pPr>
-                <a:r>
-                  <a:rPr lang="el-GR" dirty="0">
-                    <a:solidFill>
-                      <a:schemeClr val="bg1"/>
-                    </a:solidFill>
-                  </a:rPr>
-                  <a:t>1) </a:t>
-                </a:r>
-                <a:r>
-                  <a:rPr lang="el-GR" sz="2000" kern="100" dirty="0">
-                    <a:solidFill>
-                      <a:schemeClr val="bg1"/>
-                    </a:solidFill>
-                    <a:effectLst/>
-                    <a:latin typeface="Aptos" panose="020B0004020202020204" pitchFamily="34" charset="0"/>
-                    <a:ea typeface="Times New Roman" panose="02020603050405020304" pitchFamily="18" charset="0"/>
-                    <a:cs typeface="Times New Roman" panose="02020603050405020304" pitchFamily="18" charset="0"/>
-                  </a:rPr>
-                  <a:t>Μια ομάδα παίζει μόνο ένα παιχνίδι κάθε αγωνιστική</a:t>
-                </a:r>
-                <a:endParaRPr lang="el-GR" sz="2000" kern="100" dirty="0">
-                  <a:solidFill>
-                    <a:schemeClr val="bg1"/>
-                  </a:solidFill>
-                  <a:effectLst/>
-                  <a:latin typeface="Aptos" panose="020B0004020202020204" pitchFamily="34" charset="0"/>
-                  <a:ea typeface="Aptos" panose="020B0004020202020204" pitchFamily="34" charset="0"/>
-                  <a:cs typeface="Times New Roman" panose="02020603050405020304" pitchFamily="18" charset="0"/>
-                </a:endParaRPr>
-              </a:p>
-              <a:p>
-                <a:pPr indent="0" algn="ctr">
-                  <a:lnSpc>
-                    <a:spcPct val="107000"/>
-                  </a:lnSpc>
-                  <a:buNone/>
-                  <a:tabLst>
-                    <a:tab pos="5274310" algn="r"/>
-                  </a:tabLst>
-                </a:pPr>
-                <a:r>
-                  <a:rPr lang="el-GR" sz="1800" kern="100" dirty="0">
-                    <a:solidFill>
-                      <a:schemeClr val="bg1"/>
-                    </a:solidFill>
-                    <a:effectLst/>
-                    <a:latin typeface="Aptos" panose="020B0004020202020204" pitchFamily="34" charset="0"/>
-                    <a:ea typeface="Times New Roman" panose="02020603050405020304" pitchFamily="18" charset="0"/>
-                    <a:cs typeface="Times New Roman" panose="02020603050405020304" pitchFamily="18" charset="0"/>
-                  </a:rPr>
-                  <a:t> </a:t>
-                </a:r>
-                <a:endParaRPr lang="el-GR" sz="1800" kern="100" dirty="0">
-                  <a:solidFill>
-                    <a:schemeClr val="bg1"/>
-                  </a:solidFill>
-                  <a:effectLst/>
-                  <a:latin typeface="Aptos" panose="020B0004020202020204" pitchFamily="34" charset="0"/>
-                  <a:ea typeface="Aptos" panose="020B0004020202020204" pitchFamily="34" charset="0"/>
-                  <a:cs typeface="Times New Roman" panose="02020603050405020304" pitchFamily="18" charset="0"/>
-                </a:endParaRPr>
-              </a:p>
-              <a:p>
-                <a:pPr indent="0" algn="ctr">
-                  <a:lnSpc>
-                    <a:spcPct val="107000"/>
-                  </a:lnSpc>
-                  <a:buNone/>
-                  <a:tabLst>
-                    <a:tab pos="5274310" algn="r"/>
-                  </a:tabLst>
-                </a:pPr>
-                <a14:m>
-                  <m:oMathPara xmlns:m="http://schemas.openxmlformats.org/officeDocument/2006/math">
-                    <m:oMathParaPr>
-                      <m:jc m:val="centerGroup"/>
-                    </m:oMathParaPr>
-                    <m:oMath xmlns:m="http://schemas.openxmlformats.org/officeDocument/2006/math">
-                      <m:nary>
-                        <m:naryPr>
-                          <m:chr m:val="∑"/>
-                          <m:limLoc m:val="undOvr"/>
-                          <m:ctrlPr>
-                            <a:rPr lang="el-GR" sz="2400" i="1" kern="100">
-                              <a:solidFill>
-                                <a:schemeClr val="bg1"/>
-                              </a:solidFill>
-                              <a:effectLst/>
-                              <a:latin typeface="Cambria Math" panose="02040503050406030204" pitchFamily="18" charset="0"/>
-                              <a:ea typeface="Times New Roman" panose="02020603050405020304" pitchFamily="18" charset="0"/>
-                              <a:cs typeface="Times New Roman" panose="02020603050405020304" pitchFamily="18" charset="0"/>
-                            </a:rPr>
-                          </m:ctrlPr>
-                        </m:naryPr>
-                        <m:sub>
-                          <m:r>
-                            <a:rPr lang="en-US" sz="2400" i="1" kern="100">
-                              <a:solidFill>
-                                <a:schemeClr val="bg1"/>
-                              </a:solidFill>
-                              <a:effectLst/>
-                              <a:latin typeface="Cambria Math" panose="02040503050406030204" pitchFamily="18" charset="0"/>
-                              <a:ea typeface="Times New Roman" panose="02020603050405020304" pitchFamily="18" charset="0"/>
-                              <a:cs typeface="Times New Roman" panose="02020603050405020304" pitchFamily="18" charset="0"/>
-                            </a:rPr>
-                            <m:t>𝑗</m:t>
-                          </m:r>
-                          <m:r>
-                            <a:rPr lang="el-GR" sz="2400" i="1" kern="100">
-                              <a:solidFill>
-                                <a:schemeClr val="bg1"/>
-                              </a:solidFill>
-                              <a:effectLst/>
-                              <a:latin typeface="Cambria Math" panose="02040503050406030204" pitchFamily="18" charset="0"/>
-                              <a:ea typeface="Times New Roman" panose="02020603050405020304" pitchFamily="18" charset="0"/>
-                              <a:cs typeface="Times New Roman" panose="02020603050405020304" pitchFamily="18" charset="0"/>
-                            </a:rPr>
-                            <m:t>=1</m:t>
-                          </m:r>
-                        </m:sub>
-                        <m:sup>
-                          <m:r>
-                            <a:rPr lang="el-GR" sz="2400" i="1" kern="100">
-                              <a:solidFill>
-                                <a:schemeClr val="bg1"/>
-                              </a:solidFill>
-                              <a:effectLst/>
-                              <a:latin typeface="Cambria Math" panose="02040503050406030204" pitchFamily="18" charset="0"/>
-                              <a:ea typeface="Times New Roman" panose="02020603050405020304" pitchFamily="18" charset="0"/>
-                              <a:cs typeface="Times New Roman" panose="02020603050405020304" pitchFamily="18" charset="0"/>
-                            </a:rPr>
-                            <m:t>𝑛</m:t>
-                          </m:r>
-                        </m:sup>
-                        <m:e>
-                          <m:r>
-                            <a:rPr lang="el-GR" sz="2400" i="1" kern="100">
-                              <a:solidFill>
-                                <a:schemeClr val="bg1"/>
-                              </a:solidFill>
-                              <a:effectLst/>
-                              <a:latin typeface="Cambria Math" panose="02040503050406030204" pitchFamily="18" charset="0"/>
-                              <a:ea typeface="Times New Roman" panose="02020603050405020304" pitchFamily="18" charset="0"/>
-                              <a:cs typeface="Times New Roman" panose="02020603050405020304" pitchFamily="18" charset="0"/>
-                            </a:rPr>
-                            <m:t>(</m:t>
-                          </m:r>
-                          <m:sSub>
-                            <m:sSubPr>
-                              <m:ctrlPr>
-                                <a:rPr lang="el-GR" sz="2400" i="1" kern="100">
-                                  <a:solidFill>
-                                    <a:schemeClr val="bg1"/>
-                                  </a:solidFill>
-                                  <a:effectLst/>
-                                  <a:latin typeface="Cambria Math" panose="02040503050406030204" pitchFamily="18" charset="0"/>
-                                  <a:ea typeface="Times New Roman" panose="02020603050405020304" pitchFamily="18" charset="0"/>
-                                  <a:cs typeface="Times New Roman" panose="02020603050405020304" pitchFamily="18" charset="0"/>
-                                </a:rPr>
-                              </m:ctrlPr>
-                            </m:sSubPr>
-                            <m:e>
-                              <m:r>
-                                <a:rPr lang="el-GR" sz="2400" i="1" kern="100">
-                                  <a:solidFill>
-                                    <a:schemeClr val="bg1"/>
-                                  </a:solidFill>
-                                  <a:effectLst/>
-                                  <a:latin typeface="Cambria Math" panose="02040503050406030204" pitchFamily="18" charset="0"/>
-                                  <a:ea typeface="Times New Roman" panose="02020603050405020304" pitchFamily="18" charset="0"/>
-                                  <a:cs typeface="Times New Roman" panose="02020603050405020304" pitchFamily="18" charset="0"/>
-                                </a:rPr>
-                                <m:t>𝑥</m:t>
-                              </m:r>
-                            </m:e>
-                            <m:sub>
-                              <m:r>
-                                <a:rPr lang="el-GR" sz="2400" i="1" kern="100">
-                                  <a:solidFill>
-                                    <a:schemeClr val="bg1"/>
-                                  </a:solidFill>
-                                  <a:effectLst/>
-                                  <a:latin typeface="Cambria Math" panose="02040503050406030204" pitchFamily="18" charset="0"/>
-                                  <a:ea typeface="Times New Roman" panose="02020603050405020304" pitchFamily="18" charset="0"/>
-                                  <a:cs typeface="Times New Roman" panose="02020603050405020304" pitchFamily="18" charset="0"/>
-                                </a:rPr>
-                                <m:t>𝑖</m:t>
-                              </m:r>
-                              <m:r>
-                                <a:rPr lang="el-GR" sz="2400" i="1" kern="100">
-                                  <a:solidFill>
-                                    <a:schemeClr val="bg1"/>
-                                  </a:solidFill>
-                                  <a:effectLst/>
-                                  <a:latin typeface="Cambria Math" panose="02040503050406030204" pitchFamily="18" charset="0"/>
-                                  <a:ea typeface="Times New Roman" panose="02020603050405020304" pitchFamily="18" charset="0"/>
-                                  <a:cs typeface="Times New Roman" panose="02020603050405020304" pitchFamily="18" charset="0"/>
-                                </a:rPr>
-                                <m:t>,</m:t>
-                              </m:r>
-                              <m:r>
-                                <a:rPr lang="en-US" sz="2400" i="1" kern="100">
-                                  <a:solidFill>
-                                    <a:schemeClr val="bg1"/>
-                                  </a:solidFill>
-                                  <a:effectLst/>
-                                  <a:latin typeface="Cambria Math" panose="02040503050406030204" pitchFamily="18" charset="0"/>
-                                  <a:ea typeface="Times New Roman" panose="02020603050405020304" pitchFamily="18" charset="0"/>
-                                  <a:cs typeface="Times New Roman" panose="02020603050405020304" pitchFamily="18" charset="0"/>
-                                </a:rPr>
-                                <m:t>𝑗</m:t>
-                              </m:r>
-                              <m:r>
-                                <a:rPr lang="el-GR" sz="2400" i="1" kern="100">
-                                  <a:solidFill>
-                                    <a:schemeClr val="bg1"/>
-                                  </a:solidFill>
-                                  <a:effectLst/>
-                                  <a:latin typeface="Cambria Math" panose="02040503050406030204" pitchFamily="18" charset="0"/>
-                                  <a:ea typeface="Times New Roman" panose="02020603050405020304" pitchFamily="18" charset="0"/>
-                                  <a:cs typeface="Times New Roman" panose="02020603050405020304" pitchFamily="18" charset="0"/>
-                                </a:rPr>
-                                <m:t>,</m:t>
-                              </m:r>
-                              <m:r>
-                                <a:rPr lang="en-US" sz="2400" i="1" kern="100">
-                                  <a:solidFill>
-                                    <a:schemeClr val="bg1"/>
-                                  </a:solidFill>
-                                  <a:effectLst/>
-                                  <a:latin typeface="Cambria Math" panose="02040503050406030204" pitchFamily="18" charset="0"/>
-                                  <a:ea typeface="Times New Roman" panose="02020603050405020304" pitchFamily="18" charset="0"/>
-                                  <a:cs typeface="Times New Roman" panose="02020603050405020304" pitchFamily="18" charset="0"/>
-                                </a:rPr>
-                                <m:t>𝑘</m:t>
-                              </m:r>
-                            </m:sub>
-                          </m:sSub>
-                          <m:r>
-                            <a:rPr lang="el-GR" sz="2400" i="1" kern="100">
-                              <a:solidFill>
-                                <a:schemeClr val="bg1"/>
-                              </a:solidFill>
-                              <a:effectLst/>
-                              <a:latin typeface="Cambria Math" panose="02040503050406030204" pitchFamily="18" charset="0"/>
-                              <a:ea typeface="Times New Roman" panose="02020603050405020304" pitchFamily="18" charset="0"/>
-                              <a:cs typeface="Times New Roman" panose="02020603050405020304" pitchFamily="18" charset="0"/>
-                            </a:rPr>
-                            <m:t>+</m:t>
-                          </m:r>
-                          <m:sSub>
-                            <m:sSubPr>
-                              <m:ctrlPr>
-                                <a:rPr lang="el-GR" sz="2400" i="1" kern="100">
-                                  <a:solidFill>
-                                    <a:schemeClr val="bg1"/>
-                                  </a:solidFill>
-                                  <a:effectLst/>
-                                  <a:latin typeface="Cambria Math" panose="02040503050406030204" pitchFamily="18" charset="0"/>
-                                  <a:ea typeface="Times New Roman" panose="02020603050405020304" pitchFamily="18" charset="0"/>
-                                  <a:cs typeface="Times New Roman" panose="02020603050405020304" pitchFamily="18" charset="0"/>
-                                </a:rPr>
-                              </m:ctrlPr>
-                            </m:sSubPr>
-                            <m:e>
-                              <m:r>
-                                <a:rPr lang="en-US" sz="2400" i="1" kern="100">
-                                  <a:solidFill>
-                                    <a:schemeClr val="bg1"/>
-                                  </a:solidFill>
-                                  <a:effectLst/>
-                                  <a:latin typeface="Cambria Math" panose="02040503050406030204" pitchFamily="18" charset="0"/>
-                                  <a:ea typeface="Times New Roman" panose="02020603050405020304" pitchFamily="18" charset="0"/>
-                                  <a:cs typeface="Times New Roman" panose="02020603050405020304" pitchFamily="18" charset="0"/>
-                                </a:rPr>
-                                <m:t>𝑥</m:t>
-                              </m:r>
-                            </m:e>
-                            <m:sub>
-                              <m:r>
-                                <a:rPr lang="en-US" sz="2400" i="1" kern="100">
-                                  <a:solidFill>
-                                    <a:schemeClr val="bg1"/>
-                                  </a:solidFill>
-                                  <a:effectLst/>
-                                  <a:latin typeface="Cambria Math" panose="02040503050406030204" pitchFamily="18" charset="0"/>
-                                  <a:ea typeface="Times New Roman" panose="02020603050405020304" pitchFamily="18" charset="0"/>
-                                  <a:cs typeface="Times New Roman" panose="02020603050405020304" pitchFamily="18" charset="0"/>
-                                </a:rPr>
-                                <m:t>𝑗</m:t>
-                              </m:r>
-                              <m:r>
-                                <a:rPr lang="el-GR" sz="2400" i="1" kern="100">
-                                  <a:solidFill>
-                                    <a:schemeClr val="bg1"/>
-                                  </a:solidFill>
-                                  <a:effectLst/>
-                                  <a:latin typeface="Cambria Math" panose="02040503050406030204" pitchFamily="18" charset="0"/>
-                                  <a:ea typeface="Times New Roman" panose="02020603050405020304" pitchFamily="18" charset="0"/>
-                                  <a:cs typeface="Times New Roman" panose="02020603050405020304" pitchFamily="18" charset="0"/>
-                                </a:rPr>
-                                <m:t>,</m:t>
-                              </m:r>
-                              <m:r>
-                                <a:rPr lang="en-US" sz="2400" i="1" kern="100">
-                                  <a:solidFill>
-                                    <a:schemeClr val="bg1"/>
-                                  </a:solidFill>
-                                  <a:effectLst/>
-                                  <a:latin typeface="Cambria Math" panose="02040503050406030204" pitchFamily="18" charset="0"/>
-                                  <a:ea typeface="Times New Roman" panose="02020603050405020304" pitchFamily="18" charset="0"/>
-                                  <a:cs typeface="Times New Roman" panose="02020603050405020304" pitchFamily="18" charset="0"/>
-                                </a:rPr>
-                                <m:t>𝑖</m:t>
-                              </m:r>
-                              <m:r>
-                                <a:rPr lang="el-GR" sz="2400" i="1" kern="100">
-                                  <a:solidFill>
-                                    <a:schemeClr val="bg1"/>
-                                  </a:solidFill>
-                                  <a:effectLst/>
-                                  <a:latin typeface="Cambria Math" panose="02040503050406030204" pitchFamily="18" charset="0"/>
-                                  <a:ea typeface="Times New Roman" panose="02020603050405020304" pitchFamily="18" charset="0"/>
-                                  <a:cs typeface="Times New Roman" panose="02020603050405020304" pitchFamily="18" charset="0"/>
-                                </a:rPr>
-                                <m:t>,</m:t>
-                              </m:r>
-                              <m:r>
-                                <a:rPr lang="en-US" sz="2400" i="1" kern="100">
-                                  <a:solidFill>
-                                    <a:schemeClr val="bg1"/>
-                                  </a:solidFill>
-                                  <a:effectLst/>
-                                  <a:latin typeface="Cambria Math" panose="02040503050406030204" pitchFamily="18" charset="0"/>
-                                  <a:ea typeface="Times New Roman" panose="02020603050405020304" pitchFamily="18" charset="0"/>
-                                  <a:cs typeface="Times New Roman" panose="02020603050405020304" pitchFamily="18" charset="0"/>
-                                </a:rPr>
-                                <m:t>𝑘</m:t>
-                              </m:r>
-                            </m:sub>
-                          </m:sSub>
-                          <m:r>
-                            <a:rPr lang="el-GR" sz="2400" i="1" kern="100">
-                              <a:solidFill>
-                                <a:schemeClr val="bg1"/>
-                              </a:solidFill>
-                              <a:effectLst/>
-                              <a:latin typeface="Cambria Math" panose="02040503050406030204" pitchFamily="18" charset="0"/>
-                              <a:ea typeface="Times New Roman" panose="02020603050405020304" pitchFamily="18" charset="0"/>
-                              <a:cs typeface="Times New Roman" panose="02020603050405020304" pitchFamily="18" charset="0"/>
-                            </a:rPr>
-                            <m:t>)=1</m:t>
-                          </m:r>
-                        </m:e>
-                      </m:nary>
-                    </m:oMath>
-                  </m:oMathPara>
-                </a14:m>
-                <a:endParaRPr lang="el-GR" sz="2400" kern="100" dirty="0">
-                  <a:solidFill>
-                    <a:schemeClr val="bg1"/>
-                  </a:solidFill>
-                  <a:effectLst/>
-                  <a:latin typeface="Aptos" panose="020B0004020202020204" pitchFamily="34" charset="0"/>
-                  <a:ea typeface="Aptos" panose="020B0004020202020204" pitchFamily="34" charset="0"/>
-                  <a:cs typeface="Times New Roman" panose="02020603050405020304" pitchFamily="18" charset="0"/>
-                </a:endParaRPr>
-              </a:p>
-              <a:p>
-                <a:pPr indent="0" algn="ctr">
-                  <a:lnSpc>
-                    <a:spcPct val="107000"/>
-                  </a:lnSpc>
-                  <a:spcAft>
-                    <a:spcPts val="800"/>
-                  </a:spcAft>
-                  <a:buNone/>
-                  <a:tabLst>
-                    <a:tab pos="5274310" algn="r"/>
-                  </a:tabLst>
-                </a:pPr>
-                <a14:m>
-                  <m:oMathPara xmlns:m="http://schemas.openxmlformats.org/officeDocument/2006/math">
-                    <m:oMathParaPr>
-                      <m:jc m:val="centerGroup"/>
-                    </m:oMathParaPr>
-                    <m:oMath xmlns:m="http://schemas.openxmlformats.org/officeDocument/2006/math">
-                      <m:r>
-                        <a:rPr lang="el-GR" sz="2400" i="1" kern="100">
-                          <a:solidFill>
-                            <a:schemeClr val="bg1"/>
-                          </a:solidFill>
-                          <a:effectLst/>
-                          <a:latin typeface="Cambria Math" panose="02040503050406030204" pitchFamily="18" charset="0"/>
-                          <a:ea typeface="Times New Roman" panose="02020603050405020304" pitchFamily="18" charset="0"/>
-                          <a:cs typeface="Times New Roman" panose="02020603050405020304" pitchFamily="18" charset="0"/>
-                        </a:rPr>
-                        <m:t>𝑗</m:t>
-                      </m:r>
-                      <m:r>
-                        <a:rPr lang="en-US" sz="2400" i="1" kern="100">
-                          <a:solidFill>
-                            <a:schemeClr val="bg1"/>
-                          </a:solidFill>
-                          <a:effectLst/>
-                          <a:latin typeface="Cambria Math" panose="02040503050406030204" pitchFamily="18" charset="0"/>
-                          <a:ea typeface="Times New Roman" panose="02020603050405020304" pitchFamily="18" charset="0"/>
-                          <a:cs typeface="Times New Roman" panose="02020603050405020304" pitchFamily="18" charset="0"/>
-                        </a:rPr>
-                        <m:t>,</m:t>
-                      </m:r>
-                      <m:r>
-                        <a:rPr lang="en-US" sz="2400" i="1" kern="100">
-                          <a:solidFill>
-                            <a:schemeClr val="bg1"/>
-                          </a:solidFill>
-                          <a:effectLst/>
-                          <a:latin typeface="Cambria Math" panose="02040503050406030204" pitchFamily="18" charset="0"/>
-                          <a:ea typeface="Times New Roman" panose="02020603050405020304" pitchFamily="18" charset="0"/>
-                          <a:cs typeface="Times New Roman" panose="02020603050405020304" pitchFamily="18" charset="0"/>
-                        </a:rPr>
-                        <m:t>𝑖</m:t>
-                      </m:r>
-                      <m:r>
-                        <a:rPr lang="en-US" sz="2400" i="1" kern="100">
-                          <a:solidFill>
-                            <a:schemeClr val="bg1"/>
-                          </a:solidFill>
-                          <a:effectLst/>
-                          <a:latin typeface="Cambria Math" panose="02040503050406030204" pitchFamily="18" charset="0"/>
-                          <a:ea typeface="Times New Roman" panose="02020603050405020304" pitchFamily="18" charset="0"/>
-                          <a:cs typeface="Times New Roman" panose="02020603050405020304" pitchFamily="18" charset="0"/>
-                        </a:rPr>
-                        <m:t>=1,2,3....</m:t>
-                      </m:r>
-                      <m:r>
-                        <a:rPr lang="en-US" sz="2400" i="1" kern="100">
-                          <a:solidFill>
-                            <a:schemeClr val="bg1"/>
-                          </a:solidFill>
-                          <a:effectLst/>
-                          <a:latin typeface="Cambria Math" panose="02040503050406030204" pitchFamily="18" charset="0"/>
-                          <a:ea typeface="Times New Roman" panose="02020603050405020304" pitchFamily="18" charset="0"/>
-                          <a:cs typeface="Times New Roman" panose="02020603050405020304" pitchFamily="18" charset="0"/>
-                        </a:rPr>
-                        <m:t>𝑛</m:t>
-                      </m:r>
-                      <m:r>
-                        <a:rPr lang="en-US" sz="2400" i="1" kern="100">
-                          <a:solidFill>
-                            <a:schemeClr val="bg1"/>
-                          </a:solidFill>
-                          <a:effectLst/>
-                          <a:latin typeface="Cambria Math" panose="02040503050406030204" pitchFamily="18" charset="0"/>
-                          <a:ea typeface="Times New Roman" panose="02020603050405020304" pitchFamily="18" charset="0"/>
-                          <a:cs typeface="Times New Roman" panose="02020603050405020304" pitchFamily="18" charset="0"/>
-                        </a:rPr>
-                        <m:t>    </m:t>
-                      </m:r>
-                      <m:r>
-                        <a:rPr lang="en-US" sz="2400" i="1" kern="100">
-                          <a:solidFill>
-                            <a:schemeClr val="bg1"/>
-                          </a:solidFill>
-                          <a:effectLst/>
-                          <a:latin typeface="Cambria Math" panose="02040503050406030204" pitchFamily="18" charset="0"/>
-                          <a:ea typeface="Times New Roman" panose="02020603050405020304" pitchFamily="18" charset="0"/>
-                          <a:cs typeface="Times New Roman" panose="02020603050405020304" pitchFamily="18" charset="0"/>
-                        </a:rPr>
-                        <m:t>𝑘</m:t>
-                      </m:r>
-                      <m:r>
-                        <a:rPr lang="en-US" sz="2400" i="1" kern="100">
-                          <a:solidFill>
-                            <a:schemeClr val="bg1"/>
-                          </a:solidFill>
-                          <a:effectLst/>
-                          <a:latin typeface="Cambria Math" panose="02040503050406030204" pitchFamily="18" charset="0"/>
-                          <a:ea typeface="Times New Roman" panose="02020603050405020304" pitchFamily="18" charset="0"/>
-                          <a:cs typeface="Times New Roman" panose="02020603050405020304" pitchFamily="18" charset="0"/>
-                        </a:rPr>
-                        <m:t> =1,2,3.....2(</m:t>
-                      </m:r>
-                      <m:r>
-                        <a:rPr lang="en-US" sz="2400" i="1" kern="100">
-                          <a:solidFill>
-                            <a:schemeClr val="bg1"/>
-                          </a:solidFill>
-                          <a:effectLst/>
-                          <a:latin typeface="Cambria Math" panose="02040503050406030204" pitchFamily="18" charset="0"/>
-                          <a:ea typeface="Times New Roman" panose="02020603050405020304" pitchFamily="18" charset="0"/>
-                          <a:cs typeface="Times New Roman" panose="02020603050405020304" pitchFamily="18" charset="0"/>
-                        </a:rPr>
-                        <m:t>𝑛</m:t>
-                      </m:r>
-                      <m:r>
-                        <a:rPr lang="en-US" sz="2400" i="1" kern="100">
-                          <a:solidFill>
-                            <a:schemeClr val="bg1"/>
-                          </a:solidFill>
-                          <a:effectLst/>
-                          <a:latin typeface="Cambria Math" panose="02040503050406030204" pitchFamily="18" charset="0"/>
-                          <a:ea typeface="Times New Roman" panose="02020603050405020304" pitchFamily="18" charset="0"/>
-                          <a:cs typeface="Times New Roman" panose="02020603050405020304" pitchFamily="18" charset="0"/>
-                        </a:rPr>
-                        <m:t>−1) </m:t>
-                      </m:r>
-                    </m:oMath>
-                  </m:oMathPara>
-                </a14:m>
-                <a:endParaRPr lang="el-GR" sz="2400" kern="100" dirty="0">
-                  <a:solidFill>
-                    <a:schemeClr val="bg1"/>
-                  </a:solidFill>
-                  <a:effectLst/>
-                  <a:latin typeface="Aptos" panose="020B0004020202020204" pitchFamily="34" charset="0"/>
-                  <a:ea typeface="Aptos" panose="020B0004020202020204" pitchFamily="34" charset="0"/>
-                  <a:cs typeface="Times New Roman" panose="02020603050405020304" pitchFamily="18" charset="0"/>
-                </a:endParaRPr>
-              </a:p>
-              <a:p>
-                <a:pPr indent="0" algn="ctr">
-                  <a:lnSpc>
-                    <a:spcPct val="107000"/>
-                  </a:lnSpc>
-                  <a:spcAft>
-                    <a:spcPts val="800"/>
-                  </a:spcAft>
-                  <a:buNone/>
-                  <a:tabLst>
-                    <a:tab pos="5274310" algn="r"/>
-                  </a:tabLst>
-                </a:pPr>
-                <a:endParaRPr lang="el-GR" sz="1800" kern="100" dirty="0">
-                  <a:solidFill>
-                    <a:schemeClr val="bg1"/>
-                  </a:solidFill>
-                  <a:effectLst/>
-                  <a:latin typeface="Aptos" panose="020B0004020202020204" pitchFamily="34" charset="0"/>
-                  <a:ea typeface="Aptos" panose="020B0004020202020204" pitchFamily="34" charset="0"/>
-                  <a:cs typeface="Times New Roman" panose="02020603050405020304" pitchFamily="18" charset="0"/>
-                </a:endParaRPr>
-              </a:p>
-              <a:p>
-                <a:pPr marL="0" indent="0">
-                  <a:buNone/>
-                </a:pPr>
-                <a:endParaRPr lang="el-GR" dirty="0">
-                  <a:solidFill>
-                    <a:schemeClr val="bg1"/>
-                  </a:solidFill>
-                </a:endParaRPr>
-              </a:p>
-            </p:txBody>
-          </p:sp>
-        </mc:Choice>
-        <mc:Fallback xmlns="">
-          <p:sp>
-            <p:nvSpPr>
-              <p:cNvPr id="3" name="Θέση περιεχομένου 2">
-                <a:extLst>
-                  <a:ext uri="{FF2B5EF4-FFF2-40B4-BE49-F238E27FC236}">
-                    <a16:creationId xmlns:a16="http://schemas.microsoft.com/office/drawing/2014/main" id="{3E06C2F6-D0AB-64DE-E24F-BD4DA26DB27C}"/>
-                  </a:ext>
-                </a:extLst>
-              </p:cNvPr>
-              <p:cNvSpPr>
-                <a:spLocks noGrp="1" noRot="1" noChangeAspect="1" noMove="1" noResize="1" noEditPoints="1" noAdjustHandles="1" noChangeArrowheads="1" noChangeShapeType="1" noTextEdit="1"/>
-              </p:cNvSpPr>
-              <p:nvPr>
-                <p:ph idx="1"/>
-              </p:nvPr>
-            </p:nvSpPr>
-            <p:spPr>
-              <a:blipFill>
-                <a:blip r:embed="rId2"/>
-                <a:stretch>
-                  <a:fillRect l="-1217" t="-1120"/>
-                </a:stretch>
-              </a:blipFill>
-            </p:spPr>
-            <p:txBody>
-              <a:bodyPr/>
-              <a:lstStyle/>
-              <a:p>
-                <a:r>
-                  <a:rPr lang="el-GR">
-                    <a:noFill/>
-                  </a:rPr>
-                  <a:t> </a:t>
-                </a:r>
-              </a:p>
-            </p:txBody>
-          </p:sp>
-        </mc:Fallback>
-      </mc:AlternateContent>
-      <p:pic>
-        <p:nvPicPr>
-          <p:cNvPr id="5" name="Εικόνα 4">
+      <p:sp>
+        <p:nvSpPr>
+          <p:cNvPr id="3" name="Θέση περιεχομένου 2">
             <a:extLst>
               <a:ext uri="{FF2B5EF4-FFF2-40B4-BE49-F238E27FC236}">
-                <a16:creationId xmlns:a16="http://schemas.microsoft.com/office/drawing/2014/main" id="{B2D4EA56-A822-54F5-1106-1A8DF04293C1}"/>
+                <a16:creationId xmlns:a16="http://schemas.microsoft.com/office/drawing/2014/main" id="{40956826-6520-A73A-D864-76028E011AF0}"/>
               </a:ext>
             </a:extLst>
           </p:cNvPr>
-          <p:cNvPicPr>
-            <a:picLocks noChangeAspect="1"/>
-          </p:cNvPicPr>
-          <p:nvPr/>
-        </p:nvPicPr>
-        <p:blipFill>
-          <a:blip r:embed="rId3"/>
-          <a:stretch>
-            <a:fillRect/>
-          </a:stretch>
-        </p:blipFill>
-        <p:spPr>
-          <a:xfrm>
-            <a:off x="555559" y="4610810"/>
-            <a:ext cx="10885613" cy="1566153"/>
-          </a:xfrm>
-          <a:prstGeom prst="rect">
-            <a:avLst/>
-          </a:prstGeom>
-        </p:spPr>
-      </p:pic>
+          <p:cNvSpPr>
+            <a:spLocks noGrp="1"/>
+          </p:cNvSpPr>
+          <p:nvPr>
+            <p:ph idx="1"/>
+          </p:nvPr>
+        </p:nvSpPr>
+        <p:spPr/>
+        <p:txBody>
+          <a:bodyPr/>
+          <a:lstStyle/>
+          <a:p>
+            <a:pPr algn="ctr"/>
+            <a:r>
+              <a:rPr lang="el-GR" dirty="0">
+                <a:solidFill>
+                  <a:schemeClr val="bg1"/>
+                </a:solidFill>
+              </a:rPr>
+              <a:t>ΕΥΡΩΠΑΙΚΕΣ ΥΠΟΧΡΕΏΣΕΙΣ</a:t>
+            </a:r>
+          </a:p>
+          <a:p>
+            <a:pPr marL="0" indent="0">
+              <a:buNone/>
+            </a:pPr>
+            <a:endParaRPr lang="el-GR" dirty="0">
+              <a:solidFill>
+                <a:schemeClr val="bg1"/>
+              </a:solidFill>
+            </a:endParaRPr>
+          </a:p>
+          <a:p>
+            <a:pPr marL="0" indent="0">
+              <a:buNone/>
+            </a:pPr>
+            <a:r>
+              <a:rPr lang="el-GR" dirty="0">
+                <a:solidFill>
+                  <a:schemeClr val="bg1"/>
+                </a:solidFill>
+              </a:rPr>
+              <a:t>Είναι αδύνατον να γνωρίζει κάποιος από πριν την πορεία τις κάθε ομάδας σε αυτές τις διοργανώσεις έτσι ώστε να διαμορφώσει το πρόγραμμα γύρω από αυτές</a:t>
+            </a:r>
+          </a:p>
+        </p:txBody>
+      </p:sp>
     </p:spTree>
     <p:extLst>
       <p:ext uri="{BB962C8B-B14F-4D97-AF65-F5344CB8AC3E}">
-        <p14:creationId xmlns:p14="http://schemas.microsoft.com/office/powerpoint/2010/main" val="538614269"/>
+        <p14:creationId xmlns:p14="http://schemas.microsoft.com/office/powerpoint/2010/main" val="837510401"/>
       </p:ext>
     </p:extLst>
   </p:cSld>

</xml_diff>